<commit_message>
- Added notebook/14_Comparing_experiemnts_of_256_and_512.ipynb - Updated slide
</commit_message>
<xml_diff>
--- a/docs/20210715_introduction.pptx
+++ b/docs/20210715_introduction.pptx
@@ -5,7 +5,7 @@
     <p:sldMasterId id="2147483648" r:id="rId1"/>
   </p:sldMasterIdLst>
   <p:notesMasterIdLst>
-    <p:notesMasterId r:id="rId18"/>
+    <p:notesMasterId r:id="rId23"/>
   </p:notesMasterIdLst>
   <p:sldIdLst>
     <p:sldId id="256" r:id="rId2"/>
@@ -22,8 +22,13 @@
     <p:sldId id="266" r:id="rId13"/>
     <p:sldId id="267" r:id="rId14"/>
     <p:sldId id="269" r:id="rId15"/>
-    <p:sldId id="268" r:id="rId16"/>
-    <p:sldId id="271" r:id="rId17"/>
+    <p:sldId id="272" r:id="rId16"/>
+    <p:sldId id="268" r:id="rId17"/>
+    <p:sldId id="276" r:id="rId18"/>
+    <p:sldId id="275" r:id="rId19"/>
+    <p:sldId id="274" r:id="rId20"/>
+    <p:sldId id="273" r:id="rId21"/>
+    <p:sldId id="271" r:id="rId22"/>
   </p:sldIdLst>
   <p:sldSz cx="12192000" cy="6858000"/>
   <p:notesSz cx="6858000" cy="9144000"/>
@@ -212,7 +217,7 @@
           <a:p>
             <a:fld id="{D59F4B42-8895-474E-B3A6-BFB66B56F05B}" type="datetimeFigureOut">
               <a:rPr lang="en-US" smtClean="0"/>
-              <a:t>7/19/2021</a:t>
+              <a:t>7/23/2021</a:t>
             </a:fld>
             <a:endParaRPr lang="en-US"/>
           </a:p>
@@ -710,7 +715,7 @@
           <a:p>
             <a:fld id="{F59CAA65-009A-49D9-BFC9-C84E49CD40BA}" type="datetimeFigureOut">
               <a:rPr lang="en-US" smtClean="0"/>
-              <a:t>7/19/2021</a:t>
+              <a:t>7/23/2021</a:t>
             </a:fld>
             <a:endParaRPr lang="en-US"/>
           </a:p>
@@ -908,7 +913,7 @@
           <a:p>
             <a:fld id="{F59CAA65-009A-49D9-BFC9-C84E49CD40BA}" type="datetimeFigureOut">
               <a:rPr lang="en-US" smtClean="0"/>
-              <a:t>7/19/2021</a:t>
+              <a:t>7/23/2021</a:t>
             </a:fld>
             <a:endParaRPr lang="en-US"/>
           </a:p>
@@ -1116,7 +1121,7 @@
           <a:p>
             <a:fld id="{F59CAA65-009A-49D9-BFC9-C84E49CD40BA}" type="datetimeFigureOut">
               <a:rPr lang="en-US" smtClean="0"/>
-              <a:t>7/19/2021</a:t>
+              <a:t>7/23/2021</a:t>
             </a:fld>
             <a:endParaRPr lang="en-US"/>
           </a:p>
@@ -1314,7 +1319,7 @@
           <a:p>
             <a:fld id="{F59CAA65-009A-49D9-BFC9-C84E49CD40BA}" type="datetimeFigureOut">
               <a:rPr lang="en-US" smtClean="0"/>
-              <a:t>7/19/2021</a:t>
+              <a:t>7/23/2021</a:t>
             </a:fld>
             <a:endParaRPr lang="en-US"/>
           </a:p>
@@ -1589,7 +1594,7 @@
           <a:p>
             <a:fld id="{F59CAA65-009A-49D9-BFC9-C84E49CD40BA}" type="datetimeFigureOut">
               <a:rPr lang="en-US" smtClean="0"/>
-              <a:t>7/19/2021</a:t>
+              <a:t>7/23/2021</a:t>
             </a:fld>
             <a:endParaRPr lang="en-US"/>
           </a:p>
@@ -1854,7 +1859,7 @@
           <a:p>
             <a:fld id="{F59CAA65-009A-49D9-BFC9-C84E49CD40BA}" type="datetimeFigureOut">
               <a:rPr lang="en-US" smtClean="0"/>
-              <a:t>7/19/2021</a:t>
+              <a:t>7/23/2021</a:t>
             </a:fld>
             <a:endParaRPr lang="en-US"/>
           </a:p>
@@ -2266,7 +2271,7 @@
           <a:p>
             <a:fld id="{F59CAA65-009A-49D9-BFC9-C84E49CD40BA}" type="datetimeFigureOut">
               <a:rPr lang="en-US" smtClean="0"/>
-              <a:t>7/19/2021</a:t>
+              <a:t>7/23/2021</a:t>
             </a:fld>
             <a:endParaRPr lang="en-US"/>
           </a:p>
@@ -2407,7 +2412,7 @@
           <a:p>
             <a:fld id="{F59CAA65-009A-49D9-BFC9-C84E49CD40BA}" type="datetimeFigureOut">
               <a:rPr lang="en-US" smtClean="0"/>
-              <a:t>7/19/2021</a:t>
+              <a:t>7/23/2021</a:t>
             </a:fld>
             <a:endParaRPr lang="en-US"/>
           </a:p>
@@ -2520,7 +2525,7 @@
           <a:p>
             <a:fld id="{F59CAA65-009A-49D9-BFC9-C84E49CD40BA}" type="datetimeFigureOut">
               <a:rPr lang="en-US" smtClean="0"/>
-              <a:t>7/19/2021</a:t>
+              <a:t>7/23/2021</a:t>
             </a:fld>
             <a:endParaRPr lang="en-US"/>
           </a:p>
@@ -2831,7 +2836,7 @@
           <a:p>
             <a:fld id="{F59CAA65-009A-49D9-BFC9-C84E49CD40BA}" type="datetimeFigureOut">
               <a:rPr lang="en-US" smtClean="0"/>
-              <a:t>7/19/2021</a:t>
+              <a:t>7/23/2021</a:t>
             </a:fld>
             <a:endParaRPr lang="en-US"/>
           </a:p>
@@ -3119,7 +3124,7 @@
           <a:p>
             <a:fld id="{F59CAA65-009A-49D9-BFC9-C84E49CD40BA}" type="datetimeFigureOut">
               <a:rPr lang="en-US" smtClean="0"/>
-              <a:t>7/19/2021</a:t>
+              <a:t>7/23/2021</a:t>
             </a:fld>
             <a:endParaRPr lang="en-US"/>
           </a:p>
@@ -3360,7 +3365,7 @@
           <a:p>
             <a:fld id="{F59CAA65-009A-49D9-BFC9-C84E49CD40BA}" type="datetimeFigureOut">
               <a:rPr lang="en-US" smtClean="0"/>
-              <a:t>7/19/2021</a:t>
+              <a:t>7/23/2021</a:t>
             </a:fld>
             <a:endParaRPr lang="en-US"/>
           </a:p>
@@ -5777,19 +5782,17 @@
       </p:sp>
       <p:pic>
         <p:nvPicPr>
-          <p:cNvPr id="4098" name="Picture 2">
-            <a:extLst>
-              <a:ext uri="{FF2B5EF4-FFF2-40B4-BE49-F238E27FC236}">
-                <a16:creationId xmlns:a16="http://schemas.microsoft.com/office/drawing/2014/main" id="{C96CF691-3A4A-4096-9E73-BCB77BBF8604}"/>
+          <p:cNvPr id="1026" name="Picture 2">
+            <a:extLst>
+              <a:ext uri="{FF2B5EF4-FFF2-40B4-BE49-F238E27FC236}">
+                <a16:creationId xmlns:a16="http://schemas.microsoft.com/office/drawing/2014/main" id="{D29A6914-739E-4499-AEF9-26DFCB7ED5B5}"/>
               </a:ext>
             </a:extLst>
           </p:cNvPr>
           <p:cNvPicPr>
-            <a:picLocks noGrp="1" noChangeAspect="1" noChangeArrowheads="1"/>
+            <a:picLocks noChangeAspect="1" noChangeArrowheads="1"/>
           </p:cNvPicPr>
-          <p:nvPr>
-            <p:ph idx="1"/>
-          </p:nvPr>
+          <p:nvPr/>
         </p:nvPicPr>
         <p:blipFill>
           <a:blip r:embed="rId2">
@@ -5806,8 +5809,8 @@
         </p:blipFill>
         <p:spPr bwMode="auto">
           <a:xfrm>
-            <a:off x="6096000" y="1166138"/>
-            <a:ext cx="5326737" cy="5326737"/>
+            <a:off x="838198" y="1550193"/>
+            <a:ext cx="5105400" cy="5105400"/>
           </a:xfrm>
           <a:prstGeom prst="rect">
             <a:avLst/>
@@ -5824,365 +5827,147 @@
           </a:extLst>
         </p:spPr>
       </p:pic>
-      <p:sp>
-        <p:nvSpPr>
-          <p:cNvPr id="9" name="TextBox 8">
-            <a:extLst>
-              <a:ext uri="{FF2B5EF4-FFF2-40B4-BE49-F238E27FC236}">
-                <a16:creationId xmlns:a16="http://schemas.microsoft.com/office/drawing/2014/main" id="{D0ACC854-106A-4A9B-B347-C7EEC57E138F}"/>
-              </a:ext>
-            </a:extLst>
-          </p:cNvPr>
-          <p:cNvSpPr txBox="1"/>
+      <p:pic>
+        <p:nvPicPr>
+          <p:cNvPr id="1028" name="Picture 4">
+            <a:extLst>
+              <a:ext uri="{FF2B5EF4-FFF2-40B4-BE49-F238E27FC236}">
+                <a16:creationId xmlns:a16="http://schemas.microsoft.com/office/drawing/2014/main" id="{C10FE92F-0D82-4A48-A1C4-DC9A86A968D8}"/>
+              </a:ext>
+            </a:extLst>
+          </p:cNvPr>
+          <p:cNvPicPr>
+            <a:picLocks noChangeAspect="1" noChangeArrowheads="1"/>
+          </p:cNvPicPr>
           <p:nvPr/>
-        </p:nvSpPr>
-        <p:spPr>
+        </p:nvPicPr>
+        <p:blipFill>
+          <a:blip r:embed="rId3">
+            <a:extLst>
+              <a:ext uri="{28A0092B-C50C-407E-A947-70E740481C1C}">
+                <a14:useLocalDpi xmlns:a14="http://schemas.microsoft.com/office/drawing/2010/main" val="0"/>
+              </a:ext>
+            </a:extLst>
+          </a:blip>
+          <a:srcRect/>
+          <a:stretch>
+            <a:fillRect/>
+          </a:stretch>
+        </p:blipFill>
+        <p:spPr bwMode="auto">
           <a:xfrm>
-            <a:off x="899161" y="1430571"/>
-            <a:ext cx="5135879" cy="923330"/>
+            <a:off x="6248401" y="1550193"/>
+            <a:ext cx="5105399" cy="5105399"/>
           </a:xfrm>
           <a:prstGeom prst="rect">
             <a:avLst/>
           </a:prstGeom>
-          <a:solidFill>
-            <a:schemeClr val="accent5">
-              <a:lumMod val="60000"/>
-              <a:lumOff val="40000"/>
-            </a:schemeClr>
-          </a:solidFill>
-          <a:ln>
-            <a:noFill/>
-          </a:ln>
+          <a:noFill/>
+          <a:extLst>
+            <a:ext uri="{909E8E84-426E-40DD-AFC4-6F175D3DCCD1}">
+              <a14:hiddenFill xmlns:a14="http://schemas.microsoft.com/office/drawing/2010/main">
+                <a:solidFill>
+                  <a:srgbClr val="FFFFFF"/>
+                </a:solidFill>
+              </a14:hiddenFill>
+            </a:ext>
+          </a:extLst>
+        </p:spPr>
+      </p:pic>
+      <p:sp>
+        <p:nvSpPr>
+          <p:cNvPr id="5" name="矩形: 圓角 4">
+            <a:extLst>
+              <a:ext uri="{FF2B5EF4-FFF2-40B4-BE49-F238E27FC236}">
+                <a16:creationId xmlns:a16="http://schemas.microsoft.com/office/drawing/2014/main" id="{544BE0CA-8478-4E5B-B08C-87800FB65219}"/>
+              </a:ext>
+            </a:extLst>
+          </p:cNvPr>
+          <p:cNvSpPr/>
+          <p:nvPr/>
+        </p:nvSpPr>
+        <p:spPr>
+          <a:xfrm>
+            <a:off x="4139921" y="5647173"/>
+            <a:ext cx="1465834" cy="422521"/>
+          </a:xfrm>
+          <a:prstGeom prst="roundRect">
+            <a:avLst/>
+          </a:prstGeom>
         </p:spPr>
         <p:style>
-          <a:lnRef idx="0">
-            <a:scrgbClr r="0" g="0" b="0"/>
+          <a:lnRef idx="2">
+            <a:schemeClr val="accent1">
+              <a:shade val="50000"/>
+            </a:schemeClr>
           </a:lnRef>
-          <a:fillRef idx="0">
-            <a:scrgbClr r="0" g="0" b="0"/>
+          <a:fillRef idx="1">
+            <a:schemeClr val="accent1"/>
           </a:fillRef>
           <a:effectRef idx="0">
-            <a:scrgbClr r="0" g="0" b="0"/>
+            <a:schemeClr val="accent1"/>
           </a:effectRef>
           <a:fontRef idx="minor">
             <a:schemeClr val="lt1"/>
           </a:fontRef>
         </p:style>
         <p:txBody>
-          <a:bodyPr wrap="square">
-            <a:spAutoFit/>
-          </a:bodyPr>
-          <a:lstStyle/>
-          <a:p>
+          <a:bodyPr rtlCol="0" anchor="ctr"/>
+          <a:lstStyle/>
+          <a:p>
+            <a:pPr algn="ctr"/>
             <a:r>
               <a:rPr lang="en-US" dirty="0"/>
-              <a:t> -SWF: </a:t>
-            </a:r>
-          </a:p>
-          <a:p>
-            <a:r>
-              <a:rPr lang="en-US" dirty="0"/>
-              <a:t>        - PCA: hit-rate:0.92/fpr:0.20</a:t>
-            </a:r>
-          </a:p>
-          <a:p>
-            <a:r>
-              <a:rPr lang="en-US" dirty="0"/>
-              <a:t>        - Pretrained-ImageNet: hit-rate:0.90/fpr:0.19</a:t>
-            </a:r>
-          </a:p>
-        </p:txBody>
-      </p:sp>
-      <p:sp>
-        <p:nvSpPr>
-          <p:cNvPr id="11" name="TextBox 10">
-            <a:extLst>
-              <a:ext uri="{FF2B5EF4-FFF2-40B4-BE49-F238E27FC236}">
-                <a16:creationId xmlns:a16="http://schemas.microsoft.com/office/drawing/2014/main" id="{9F00C93A-5CAC-4ED0-B408-947F21DB474A}"/>
-              </a:ext>
-            </a:extLst>
-          </p:cNvPr>
-          <p:cNvSpPr txBox="1"/>
+              <a:t>256x256</a:t>
+            </a:r>
+          </a:p>
+        </p:txBody>
+      </p:sp>
+      <p:sp>
+        <p:nvSpPr>
+          <p:cNvPr id="14" name="矩形: 圓角 13">
+            <a:extLst>
+              <a:ext uri="{FF2B5EF4-FFF2-40B4-BE49-F238E27FC236}">
+                <a16:creationId xmlns:a16="http://schemas.microsoft.com/office/drawing/2014/main" id="{B96C9DD5-95AC-466C-B3DD-4AFA59826235}"/>
+              </a:ext>
+            </a:extLst>
+          </p:cNvPr>
+          <p:cNvSpPr/>
           <p:nvPr/>
         </p:nvSpPr>
         <p:spPr>
           <a:xfrm>
-            <a:off x="899161" y="2417579"/>
-            <a:ext cx="5135878" cy="1200329"/>
+            <a:off x="9587802" y="5647172"/>
+            <a:ext cx="1465834" cy="422521"/>
           </a:xfrm>
-          <a:prstGeom prst="rect">
+          <a:prstGeom prst="roundRect">
             <a:avLst/>
           </a:prstGeom>
-          <a:solidFill>
-            <a:schemeClr val="accent5"/>
-          </a:solidFill>
-          <a:ln>
-            <a:noFill/>
-          </a:ln>
         </p:spPr>
         <p:style>
-          <a:lnRef idx="0">
-            <a:scrgbClr r="0" g="0" b="0"/>
+          <a:lnRef idx="2">
+            <a:schemeClr val="accent1">
+              <a:shade val="50000"/>
+            </a:schemeClr>
           </a:lnRef>
-          <a:fillRef idx="0">
-            <a:scrgbClr r="0" g="0" b="0"/>
+          <a:fillRef idx="1">
+            <a:schemeClr val="accent1"/>
           </a:fillRef>
           <a:effectRef idx="0">
-            <a:scrgbClr r="0" g="0" b="0"/>
+            <a:schemeClr val="accent1"/>
           </a:effectRef>
           <a:fontRef idx="minor">
             <a:schemeClr val="lt1"/>
           </a:fontRef>
         </p:style>
         <p:txBody>
-          <a:bodyPr wrap="square">
-            <a:spAutoFit/>
-          </a:bodyPr>
-          <a:lstStyle/>
-          <a:p>
+          <a:bodyPr rtlCol="0" anchor="ctr"/>
+          <a:lstStyle/>
+          <a:p>
+            <a:pPr algn="ctr"/>
             <a:r>
               <a:rPr lang="en-US" dirty="0"/>
-              <a:t> - NE:</a:t>
-            </a:r>
-          </a:p>
-          <a:p>
-            <a:r>
-              <a:rPr lang="en-US" dirty="0"/>
-              <a:t>        - PCA: hit-rate:0.78/fpr:0.30</a:t>
-            </a:r>
-          </a:p>
-          <a:p>
-            <a:r>
-              <a:rPr lang="en-US" dirty="0"/>
-              <a:t>        - CAE: hit-rate:0.77/fpr:0.29</a:t>
-            </a:r>
-          </a:p>
-          <a:p>
-            <a:r>
-              <a:rPr lang="en-US" dirty="0"/>
-              <a:t>        - Pretrained-ImageNet:0.74/fpr:0.29</a:t>
-            </a:r>
-          </a:p>
-        </p:txBody>
-      </p:sp>
-      <p:sp>
-        <p:nvSpPr>
-          <p:cNvPr id="13" name="TextBox 12">
-            <a:extLst>
-              <a:ext uri="{FF2B5EF4-FFF2-40B4-BE49-F238E27FC236}">
-                <a16:creationId xmlns:a16="http://schemas.microsoft.com/office/drawing/2014/main" id="{059B4B91-D5C4-4FAC-A030-526EEA76899A}"/>
-              </a:ext>
-            </a:extLst>
-          </p:cNvPr>
-          <p:cNvSpPr txBox="1"/>
-          <p:nvPr/>
-        </p:nvSpPr>
-        <p:spPr>
-          <a:xfrm>
-            <a:off x="899161" y="3681586"/>
-            <a:ext cx="5135878" cy="923330"/>
-          </a:xfrm>
-          <a:prstGeom prst="rect">
-            <a:avLst/>
-          </a:prstGeom>
-          <a:solidFill>
-            <a:schemeClr val="accent5">
-              <a:lumMod val="75000"/>
-            </a:schemeClr>
-          </a:solidFill>
-          <a:ln>
-            <a:noFill/>
-          </a:ln>
-        </p:spPr>
-        <p:style>
-          <a:lnRef idx="0">
-            <a:scrgbClr r="0" g="0" b="0"/>
-          </a:lnRef>
-          <a:fillRef idx="0">
-            <a:scrgbClr r="0" g="0" b="0"/>
-          </a:fillRef>
-          <a:effectRef idx="0">
-            <a:scrgbClr r="0" g="0" b="0"/>
-          </a:effectRef>
-          <a:fontRef idx="minor">
-            <a:schemeClr val="lt1"/>
-          </a:fontRef>
-        </p:style>
-        <p:txBody>
-          <a:bodyPr wrap="square">
-            <a:spAutoFit/>
-          </a:bodyPr>
-          <a:lstStyle/>
-          <a:p>
-            <a:r>
-              <a:rPr lang="en-US" dirty="0"/>
-              <a:t> - NWPTY</a:t>
-            </a:r>
-          </a:p>
-          <a:p>
-            <a:r>
-              <a:rPr lang="en-US" dirty="0"/>
-              <a:t>        - Pretrained-ImageNet: hit-rate:0.77/fpr:0.13</a:t>
-            </a:r>
-          </a:p>
-          <a:p>
-            <a:r>
-              <a:rPr lang="en-US" dirty="0"/>
-              <a:t>        - PCA: hit-rate:0.70/fpr:0.17</a:t>
-            </a:r>
-          </a:p>
-        </p:txBody>
-      </p:sp>
-      <p:sp>
-        <p:nvSpPr>
-          <p:cNvPr id="15" name="TextBox 14">
-            <a:extLst>
-              <a:ext uri="{FF2B5EF4-FFF2-40B4-BE49-F238E27FC236}">
-                <a16:creationId xmlns:a16="http://schemas.microsoft.com/office/drawing/2014/main" id="{D91B051C-CEB5-4F36-B5D8-CD1FF00D42F8}"/>
-              </a:ext>
-            </a:extLst>
-          </p:cNvPr>
-          <p:cNvSpPr txBox="1"/>
-          <p:nvPr/>
-        </p:nvSpPr>
-        <p:spPr>
-          <a:xfrm>
-            <a:off x="899161" y="4668594"/>
-            <a:ext cx="5135878" cy="1477328"/>
-          </a:xfrm>
-          <a:prstGeom prst="rect">
-            <a:avLst/>
-          </a:prstGeom>
-          <a:solidFill>
-            <a:schemeClr val="accent5">
-              <a:lumMod val="50000"/>
-            </a:schemeClr>
-          </a:solidFill>
-          <a:ln>
-            <a:noFill/>
-          </a:ln>
-        </p:spPr>
-        <p:style>
-          <a:lnRef idx="0">
-            <a:scrgbClr r="0" g="0" b="0"/>
-          </a:lnRef>
-          <a:fillRef idx="0">
-            <a:scrgbClr r="0" g="0" b="0"/>
-          </a:fillRef>
-          <a:effectRef idx="0">
-            <a:scrgbClr r="0" g="0" b="0"/>
-          </a:effectRef>
-          <a:fontRef idx="minor">
-            <a:schemeClr val="lt1"/>
-          </a:fontRef>
-        </p:style>
-        <p:txBody>
-          <a:bodyPr wrap="square">
-            <a:spAutoFit/>
-          </a:bodyPr>
-          <a:lstStyle/>
-          <a:p>
-            <a:r>
-              <a:rPr lang="en-US" dirty="0"/>
-              <a:t> - HRH:</a:t>
-            </a:r>
-          </a:p>
-          <a:p>
-            <a:r>
-              <a:rPr lang="en-US" dirty="0"/>
-              <a:t>        - Pretrained-BigEarth:0.7/fpr:0.37</a:t>
-            </a:r>
-          </a:p>
-          <a:p>
-            <a:r>
-              <a:rPr lang="en-US" dirty="0"/>
-              <a:t>        - Pretrained-ImageNet:0.68/fpr:0.36</a:t>
-            </a:r>
-          </a:p>
-          <a:p>
-            <a:r>
-              <a:rPr lang="en-US" dirty="0"/>
-              <a:t>        - CAE: hit-rate:0.65/fpr:0.27</a:t>
-            </a:r>
-          </a:p>
-          <a:p>
-            <a:r>
-              <a:rPr lang="en-US" dirty="0"/>
-              <a:t>        - PCA: hit-rate:0.62/fpr:0.27</a:t>
-            </a:r>
-          </a:p>
-        </p:txBody>
-      </p:sp>
-      <p:sp>
-        <p:nvSpPr>
-          <p:cNvPr id="17" name="TextBox 16">
-            <a:extLst>
-              <a:ext uri="{FF2B5EF4-FFF2-40B4-BE49-F238E27FC236}">
-                <a16:creationId xmlns:a16="http://schemas.microsoft.com/office/drawing/2014/main" id="{AB87839F-24B8-4FE3-8A95-EC61EC5A23B3}"/>
-              </a:ext>
-            </a:extLst>
-          </p:cNvPr>
-          <p:cNvSpPr txBox="1"/>
-          <p:nvPr/>
-        </p:nvSpPr>
-        <p:spPr>
-          <a:xfrm>
-            <a:off x="6780007" y="4668594"/>
-            <a:ext cx="4354158" cy="1226597"/>
-          </a:xfrm>
-          <a:prstGeom prst="rect">
-            <a:avLst/>
-          </a:prstGeom>
-          <a:solidFill>
-            <a:schemeClr val="dk1">
-              <a:alpha val="50000"/>
-            </a:schemeClr>
-          </a:solidFill>
-          <a:ln>
-            <a:noFill/>
-          </a:ln>
-        </p:spPr>
-        <p:style>
-          <a:lnRef idx="0">
-            <a:scrgbClr r="0" g="0" b="0"/>
-          </a:lnRef>
-          <a:fillRef idx="0">
-            <a:scrgbClr r="0" g="0" b="0"/>
-          </a:fillRef>
-          <a:effectRef idx="0">
-            <a:scrgbClr r="0" g="0" b="0"/>
-          </a:effectRef>
-          <a:fontRef idx="minor">
-            <a:schemeClr val="lt1"/>
-          </a:fontRef>
-        </p:style>
-        <p:txBody>
-          <a:bodyPr wrap="square">
-            <a:spAutoFit/>
-          </a:bodyPr>
-          <a:lstStyle/>
-          <a:p>
-            <a:r>
-              <a:rPr lang="en-US" dirty="0"/>
-              <a:t> - FT:</a:t>
-            </a:r>
-          </a:p>
-          <a:p>
-            <a:r>
-              <a:rPr lang="en-US" dirty="0"/>
-              <a:t>        - PCA: hit-rate:0.67/fpr:0.24</a:t>
-            </a:r>
-          </a:p>
-          <a:p>
-            <a:r>
-              <a:rPr lang="en-US" dirty="0"/>
-              <a:t>        - CAE: hit-rate:0.66/fpr:0.21</a:t>
-            </a:r>
-          </a:p>
-          <a:p>
-            <a:r>
-              <a:rPr lang="en-US" dirty="0"/>
-              <a:t>        - Pretrained-ImageNet:0.64/fpr:0.28</a:t>
+              <a:t>512x512</a:t>
             </a:r>
           </a:p>
         </p:txBody>
@@ -6190,7 +5975,7 @@
     </p:spTree>
     <p:extLst>
       <p:ext uri="{BB962C8B-B14F-4D97-AF65-F5344CB8AC3E}">
-        <p14:creationId xmlns:p14="http://schemas.microsoft.com/office/powerpoint/2010/main" val="2580850821"/>
+        <p14:creationId xmlns:p14="http://schemas.microsoft.com/office/powerpoint/2010/main" val="3129420075"/>
       </p:ext>
     </p:extLst>
   </p:cSld>
@@ -6222,7 +6007,7 @@
           <p:cNvPr id="2" name="Title 1">
             <a:extLst>
               <a:ext uri="{FF2B5EF4-FFF2-40B4-BE49-F238E27FC236}">
-                <a16:creationId xmlns:a16="http://schemas.microsoft.com/office/drawing/2014/main" id="{EA1937A3-5434-47CC-A80E-0F060042D66E}"/>
+                <a16:creationId xmlns:a16="http://schemas.microsoft.com/office/drawing/2014/main" id="{5993A627-EF9A-469E-A138-91301DA13DEF}"/>
               </a:ext>
             </a:extLst>
           </p:cNvPr>
@@ -6248,58 +6033,1737 @@
                   </a:outerShdw>
                 </a:effectLst>
               </a:rPr>
-              <a:t>Takeaways</a:t>
-            </a:r>
-          </a:p>
-        </p:txBody>
-      </p:sp>
-      <p:sp>
-        <p:nvSpPr>
-          <p:cNvPr id="3" name="Content Placeholder 2">
-            <a:extLst>
-              <a:ext uri="{FF2B5EF4-FFF2-40B4-BE49-F238E27FC236}">
-                <a16:creationId xmlns:a16="http://schemas.microsoft.com/office/drawing/2014/main" id="{AAB5C6FE-9CFD-472C-9662-A37F816C2AD0}"/>
-              </a:ext>
-            </a:extLst>
-          </p:cNvPr>
-          <p:cNvSpPr>
-            <a:spLocks noGrp="1"/>
-          </p:cNvSpPr>
-          <p:nvPr>
-            <p:ph idx="1"/>
-          </p:nvPr>
-        </p:nvSpPr>
-        <p:spPr/>
-        <p:txBody>
-          <a:bodyPr/>
-          <a:lstStyle/>
-          <a:p>
+              <a:t>Precipitation</a:t>
+            </a:r>
+          </a:p>
+        </p:txBody>
+      </p:sp>
+      <p:sp>
+        <p:nvSpPr>
+          <p:cNvPr id="12" name="文字方塊 11">
+            <a:extLst>
+              <a:ext uri="{FF2B5EF4-FFF2-40B4-BE49-F238E27FC236}">
+                <a16:creationId xmlns:a16="http://schemas.microsoft.com/office/drawing/2014/main" id="{14221F38-C38C-4AE0-84CC-63BDF274C4A3}"/>
+              </a:ext>
+            </a:extLst>
+          </p:cNvPr>
+          <p:cNvSpPr txBox="1"/>
+          <p:nvPr/>
+        </p:nvSpPr>
+        <p:spPr>
+          <a:xfrm>
+            <a:off x="838200" y="2518268"/>
+            <a:ext cx="7552174" cy="1569660"/>
+          </a:xfrm>
+          <a:prstGeom prst="rect">
+            <a:avLst/>
+          </a:prstGeom>
+          <a:noFill/>
+        </p:spPr>
+        <p:txBody>
+          <a:bodyPr wrap="square">
+            <a:spAutoFit/>
+          </a:bodyPr>
+          <a:lstStyle/>
+          <a:p>
+            <a:r>
+              <a:rPr lang="en-US" sz="1600" dirty="0">
+                <a:latin typeface="Consolas" panose="020B0609020204030204" pitchFamily="49" charset="0"/>
+              </a:rPr>
+              <a:t> id event feature  sensitivity     </a:t>
+            </a:r>
+            <a:r>
+              <a:rPr lang="en-US" sz="1600" dirty="0" err="1">
+                <a:latin typeface="Consolas" panose="020B0609020204030204" pitchFamily="49" charset="0"/>
+              </a:rPr>
+              <a:t>fpr</a:t>
+            </a:r>
+            <a:r>
+              <a:rPr lang="en-US" sz="1600" dirty="0">
+                <a:latin typeface="Consolas" panose="020B0609020204030204" pitchFamily="49" charset="0"/>
+              </a:rPr>
+              <a:t>  </a:t>
+            </a:r>
+            <a:r>
+              <a:rPr lang="en-US" sz="1600" dirty="0" err="1">
+                <a:latin typeface="Consolas" panose="020B0609020204030204" pitchFamily="49" charset="0"/>
+              </a:rPr>
+              <a:t>threat_score</a:t>
+            </a:r>
+            <a:endParaRPr lang="en-US" sz="1600" dirty="0">
+              <a:latin typeface="Consolas" panose="020B0609020204030204" pitchFamily="49" charset="0"/>
+            </a:endParaRPr>
+          </a:p>
+          <a:p>
+            <a:r>
+              <a:rPr lang="en-US" sz="1600" dirty="0">
+                <a:latin typeface="Consolas" panose="020B0609020204030204" pitchFamily="49" charset="0"/>
+              </a:rPr>
+              <a:t>0   PCA-HRH   HRH     PCA         0.63  0.2722        0.4187</a:t>
+            </a:r>
+          </a:p>
+          <a:p>
+            <a:r>
+              <a:rPr lang="en-US" sz="1600" dirty="0">
+                <a:latin typeface="Consolas" panose="020B0609020204030204" pitchFamily="49" charset="0"/>
+              </a:rPr>
+              <a:t>1   CAE-HRH   HRH     CAE         0.63  0.2722        </a:t>
+            </a:r>
+            <a:r>
+              <a:rPr lang="en-US" sz="1600" b="1" dirty="0">
+                <a:latin typeface="Consolas" panose="020B0609020204030204" pitchFamily="49" charset="0"/>
+              </a:rPr>
+              <a:t>0.4200</a:t>
+            </a:r>
+          </a:p>
+          <a:p>
+            <a:r>
+              <a:rPr lang="en-US" sz="1600" dirty="0">
+                <a:latin typeface="Consolas" panose="020B0609020204030204" pitchFamily="49" charset="0"/>
+              </a:rPr>
+              <a:t>2  CVAE-HRH   HRH    CVAE         0.47  0.4148        0.2661</a:t>
+            </a:r>
+          </a:p>
+          <a:p>
+            <a:r>
+              <a:rPr lang="en-US" sz="1600" dirty="0">
+                <a:highlight>
+                  <a:srgbClr val="FFFF00"/>
+                </a:highlight>
+                <a:latin typeface="Consolas" panose="020B0609020204030204" pitchFamily="49" charset="0"/>
+              </a:rPr>
+              <a:t>3  PTBE-HRH   HRH    PTBE         0.69  0.3698        0.4151</a:t>
+            </a:r>
+          </a:p>
+          <a:p>
+            <a:r>
+              <a:rPr lang="en-US" sz="1600" dirty="0">
+                <a:latin typeface="Consolas" panose="020B0609020204030204" pitchFamily="49" charset="0"/>
+              </a:rPr>
+              <a:t>4  PTIN-HRH   HRH    PTIN         0.67  0.3451        0.4146</a:t>
+            </a:r>
+            <a:endParaRPr lang="en-US" sz="1600" dirty="0">
+              <a:highlight>
+                <a:srgbClr val="FFFF00"/>
+              </a:highlight>
+              <a:latin typeface="Consolas" panose="020B0609020204030204" pitchFamily="49" charset="0"/>
+            </a:endParaRPr>
+          </a:p>
+        </p:txBody>
+      </p:sp>
+      <p:sp>
+        <p:nvSpPr>
+          <p:cNvPr id="14" name="文字方塊 13">
+            <a:extLst>
+              <a:ext uri="{FF2B5EF4-FFF2-40B4-BE49-F238E27FC236}">
+                <a16:creationId xmlns:a16="http://schemas.microsoft.com/office/drawing/2014/main" id="{FEAE8936-DBAA-4684-8CA1-551F24CFC435}"/>
+              </a:ext>
+            </a:extLst>
+          </p:cNvPr>
+          <p:cNvSpPr txBox="1"/>
+          <p:nvPr/>
+        </p:nvSpPr>
+        <p:spPr>
+          <a:xfrm>
+            <a:off x="838199" y="4591331"/>
+            <a:ext cx="7552174" cy="1569660"/>
+          </a:xfrm>
+          <a:prstGeom prst="rect">
+            <a:avLst/>
+          </a:prstGeom>
+          <a:noFill/>
+        </p:spPr>
+        <p:txBody>
+          <a:bodyPr wrap="square">
+            <a:spAutoFit/>
+          </a:bodyPr>
+          <a:lstStyle/>
+          <a:p>
+            <a:r>
+              <a:rPr lang="en-US" sz="1600" dirty="0">
+                <a:latin typeface="Consolas" panose="020B0609020204030204" pitchFamily="49" charset="0"/>
+              </a:rPr>
+              <a:t> id event feature  sensitivity     </a:t>
+            </a:r>
+            <a:r>
+              <a:rPr lang="en-US" sz="1600" dirty="0" err="1">
+                <a:latin typeface="Consolas" panose="020B0609020204030204" pitchFamily="49" charset="0"/>
+              </a:rPr>
+              <a:t>fpr</a:t>
+            </a:r>
+            <a:r>
+              <a:rPr lang="en-US" sz="1600" dirty="0">
+                <a:latin typeface="Consolas" panose="020B0609020204030204" pitchFamily="49" charset="0"/>
+              </a:rPr>
+              <a:t>  </a:t>
+            </a:r>
+            <a:r>
+              <a:rPr lang="en-US" sz="1600" dirty="0" err="1">
+                <a:latin typeface="Consolas" panose="020B0609020204030204" pitchFamily="49" charset="0"/>
+              </a:rPr>
+              <a:t>threat_score</a:t>
+            </a:r>
+            <a:endParaRPr lang="en-US" sz="1600" dirty="0">
+              <a:latin typeface="Consolas" panose="020B0609020204030204" pitchFamily="49" charset="0"/>
+            </a:endParaRPr>
+          </a:p>
+          <a:p>
+            <a:r>
+              <a:rPr lang="en-US" sz="1600" dirty="0">
+                <a:latin typeface="Consolas" panose="020B0609020204030204" pitchFamily="49" charset="0"/>
+              </a:rPr>
+              <a:t>0   PCA-HRH   HRH     PCA         0.60  0.2787        0.3974</a:t>
+            </a:r>
+          </a:p>
+          <a:p>
+            <a:r>
+              <a:rPr lang="en-US" sz="1600" dirty="0">
+                <a:latin typeface="Consolas" panose="020B0609020204030204" pitchFamily="49" charset="0"/>
+              </a:rPr>
+              <a:t>1   CAE-HRH   HRH     CAE         0.64  0.2626        </a:t>
+            </a:r>
+            <a:r>
+              <a:rPr lang="en-US" sz="1600" b="1" dirty="0">
+                <a:latin typeface="Consolas" panose="020B0609020204030204" pitchFamily="49" charset="0"/>
+              </a:rPr>
+              <a:t>0.4329</a:t>
+            </a:r>
+          </a:p>
+          <a:p>
+            <a:r>
+              <a:rPr lang="en-US" sz="1600" dirty="0">
+                <a:latin typeface="Consolas" panose="020B0609020204030204" pitchFamily="49" charset="0"/>
+              </a:rPr>
+              <a:t>2  CVAE-HRH   HRH    CVAE         0.44  0.4319        0.2462</a:t>
+            </a:r>
+          </a:p>
+          <a:p>
+            <a:r>
+              <a:rPr lang="en-US" sz="1600" dirty="0">
+                <a:latin typeface="Consolas" panose="020B0609020204030204" pitchFamily="49" charset="0"/>
+              </a:rPr>
+              <a:t>3  PTBE-HRH   HRH    PTBE         0.68  0.3719        0.4060</a:t>
+            </a:r>
+          </a:p>
+          <a:p>
+            <a:r>
+              <a:rPr lang="en-US" sz="1600" dirty="0">
+                <a:highlight>
+                  <a:srgbClr val="FFFF00"/>
+                </a:highlight>
+                <a:latin typeface="Consolas" panose="020B0609020204030204" pitchFamily="49" charset="0"/>
+              </a:rPr>
+              <a:t>4  PTIN-HRH   HRH    PTIN         0.69  0.3805        0.4057</a:t>
+            </a:r>
+          </a:p>
+        </p:txBody>
+      </p:sp>
+      <p:sp>
+        <p:nvSpPr>
+          <p:cNvPr id="18" name="矩形: 圓角 17">
+            <a:extLst>
+              <a:ext uri="{FF2B5EF4-FFF2-40B4-BE49-F238E27FC236}">
+                <a16:creationId xmlns:a16="http://schemas.microsoft.com/office/drawing/2014/main" id="{A9C5098A-F708-4510-A2C7-536F5B488CD0}"/>
+              </a:ext>
+            </a:extLst>
+          </p:cNvPr>
+          <p:cNvSpPr/>
+          <p:nvPr/>
+        </p:nvSpPr>
+        <p:spPr>
+          <a:xfrm>
+            <a:off x="838199" y="2095747"/>
+            <a:ext cx="1465834" cy="422521"/>
+          </a:xfrm>
+          <a:prstGeom prst="roundRect">
+            <a:avLst/>
+          </a:prstGeom>
+        </p:spPr>
+        <p:style>
+          <a:lnRef idx="2">
+            <a:schemeClr val="accent1">
+              <a:shade val="50000"/>
+            </a:schemeClr>
+          </a:lnRef>
+          <a:fillRef idx="1">
+            <a:schemeClr val="accent1"/>
+          </a:fillRef>
+          <a:effectRef idx="0">
+            <a:schemeClr val="accent1"/>
+          </a:effectRef>
+          <a:fontRef idx="minor">
+            <a:schemeClr val="lt1"/>
+          </a:fontRef>
+        </p:style>
+        <p:txBody>
+          <a:bodyPr rtlCol="0" anchor="ctr"/>
+          <a:lstStyle/>
+          <a:p>
+            <a:pPr algn="ctr"/>
             <a:r>
               <a:rPr lang="en-US" dirty="0"/>
-              <a:t>The pretrained models perform very well. And pretrained with only ImageNet performs even better.</a:t>
-            </a:r>
-          </a:p>
-          <a:p>
+              <a:t>256x256</a:t>
+            </a:r>
+          </a:p>
+        </p:txBody>
+      </p:sp>
+      <p:sp>
+        <p:nvSpPr>
+          <p:cNvPr id="19" name="矩形: 圓角 18">
+            <a:extLst>
+              <a:ext uri="{FF2B5EF4-FFF2-40B4-BE49-F238E27FC236}">
+                <a16:creationId xmlns:a16="http://schemas.microsoft.com/office/drawing/2014/main" id="{07894ACD-8097-43E0-AFD2-4FBD783C8D92}"/>
+              </a:ext>
+            </a:extLst>
+          </p:cNvPr>
+          <p:cNvSpPr/>
+          <p:nvPr/>
+        </p:nvSpPr>
+        <p:spPr>
+          <a:xfrm>
+            <a:off x="838199" y="4168810"/>
+            <a:ext cx="1465834" cy="422521"/>
+          </a:xfrm>
+          <a:prstGeom prst="roundRect">
+            <a:avLst/>
+          </a:prstGeom>
+        </p:spPr>
+        <p:style>
+          <a:lnRef idx="2">
+            <a:schemeClr val="accent1">
+              <a:shade val="50000"/>
+            </a:schemeClr>
+          </a:lnRef>
+          <a:fillRef idx="1">
+            <a:schemeClr val="accent1"/>
+          </a:fillRef>
+          <a:effectRef idx="0">
+            <a:schemeClr val="accent1"/>
+          </a:effectRef>
+          <a:fontRef idx="minor">
+            <a:schemeClr val="lt1"/>
+          </a:fontRef>
+        </p:style>
+        <p:txBody>
+          <a:bodyPr rtlCol="0" anchor="ctr"/>
+          <a:lstStyle/>
+          <a:p>
+            <a:pPr algn="ctr"/>
             <a:r>
               <a:rPr lang="en-US" dirty="0"/>
-              <a:t>The good old friend, PCA, is a decent method. The performance of PCA is similar to CAE, and the algorithm is solid and robust.</a:t>
-            </a:r>
-          </a:p>
+              <a:t>512x512</a:t>
+            </a:r>
+          </a:p>
+        </p:txBody>
+      </p:sp>
+      <p:sp>
+        <p:nvSpPr>
+          <p:cNvPr id="7" name="矩形 6">
+            <a:extLst>
+              <a:ext uri="{FF2B5EF4-FFF2-40B4-BE49-F238E27FC236}">
+                <a16:creationId xmlns:a16="http://schemas.microsoft.com/office/drawing/2014/main" id="{0CC309A6-C6FF-4E8E-B77B-8DA20D8ECAD5}"/>
+              </a:ext>
+            </a:extLst>
+          </p:cNvPr>
+          <p:cNvSpPr/>
+          <p:nvPr/>
+        </p:nvSpPr>
+        <p:spPr>
+          <a:xfrm>
+            <a:off x="838199" y="1592344"/>
+            <a:ext cx="10515600" cy="422521"/>
+          </a:xfrm>
+          <a:prstGeom prst="rect">
+            <a:avLst/>
+          </a:prstGeom>
+          <a:solidFill>
+            <a:schemeClr val="accent5"/>
+          </a:solidFill>
+          <a:ln>
+            <a:noFill/>
+          </a:ln>
+        </p:spPr>
+        <p:style>
+          <a:lnRef idx="0">
+            <a:scrgbClr r="0" g="0" b="0"/>
+          </a:lnRef>
+          <a:fillRef idx="0">
+            <a:scrgbClr r="0" g="0" b="0"/>
+          </a:fillRef>
+          <a:effectRef idx="0">
+            <a:scrgbClr r="0" g="0" b="0"/>
+          </a:effectRef>
+          <a:fontRef idx="minor">
+            <a:schemeClr val="lt1"/>
+          </a:fontRef>
+        </p:style>
+        <p:txBody>
+          <a:bodyPr rtlCol="0" anchor="ctr"/>
+          <a:lstStyle/>
           <a:p>
             <a:r>
               <a:rPr lang="en-US" dirty="0"/>
-              <a:t>SWF can be detected with a high hit-rate (0.92). NE is not as good as SWF but is still not bad. This suggests that the satellite image can provide information about synoptic scale wind patterns.</a:t>
-            </a:r>
-          </a:p>
-          <a:p>
-            <a:endParaRPr lang="en-US" dirty="0"/>
+              <a:t>Definition: any station in Taipei Basin recorded a precipitation &gt;= 10mm/hour within the day.</a:t>
+            </a:r>
           </a:p>
         </p:txBody>
       </p:sp>
     </p:spTree>
     <p:extLst>
       <p:ext uri="{BB962C8B-B14F-4D97-AF65-F5344CB8AC3E}">
-        <p14:creationId xmlns:p14="http://schemas.microsoft.com/office/powerpoint/2010/main" val="3225063580"/>
+        <p14:creationId xmlns:p14="http://schemas.microsoft.com/office/powerpoint/2010/main" val="2580850821"/>
+      </p:ext>
+    </p:extLst>
+  </p:cSld>
+  <p:clrMapOvr>
+    <a:masterClrMapping/>
+  </p:clrMapOvr>
+</p:sld>
+</file>
+
+<file path=ppt/slides/slide17.xml><?xml version="1.0" encoding="utf-8"?>
+<p:sld xmlns:a="http://schemas.openxmlformats.org/drawingml/2006/main" xmlns:r="http://schemas.openxmlformats.org/officeDocument/2006/relationships" xmlns:p="http://schemas.openxmlformats.org/presentationml/2006/main">
+  <p:cSld>
+    <p:spTree>
+      <p:nvGrpSpPr>
+        <p:cNvPr id="1" name=""/>
+        <p:cNvGrpSpPr/>
+        <p:nvPr/>
+      </p:nvGrpSpPr>
+      <p:grpSpPr>
+        <a:xfrm>
+          <a:off x="0" y="0"/>
+          <a:ext cx="0" cy="0"/>
+          <a:chOff x="0" y="0"/>
+          <a:chExt cx="0" cy="0"/>
+        </a:xfrm>
+      </p:grpSpPr>
+      <p:sp>
+        <p:nvSpPr>
+          <p:cNvPr id="2" name="Title 1">
+            <a:extLst>
+              <a:ext uri="{FF2B5EF4-FFF2-40B4-BE49-F238E27FC236}">
+                <a16:creationId xmlns:a16="http://schemas.microsoft.com/office/drawing/2014/main" id="{5993A627-EF9A-469E-A138-91301DA13DEF}"/>
+              </a:ext>
+            </a:extLst>
+          </p:cNvPr>
+          <p:cNvSpPr>
+            <a:spLocks noGrp="1"/>
+          </p:cNvSpPr>
+          <p:nvPr>
+            <p:ph type="title"/>
+          </p:nvPr>
+        </p:nvSpPr>
+        <p:spPr/>
+        <p:txBody>
+          <a:bodyPr/>
+          <a:lstStyle/>
+          <a:p>
+            <a:r>
+              <a:rPr lang="en-US" b="1" dirty="0">
+                <a:effectLst>
+                  <a:outerShdw blurRad="38100" dist="38100" dir="2700000" algn="tl">
+                    <a:srgbClr val="000000">
+                      <a:alpha val="43137"/>
+                    </a:srgbClr>
+                  </a:outerShdw>
+                </a:effectLst>
+              </a:rPr>
+              <a:t>NWPTC</a:t>
+            </a:r>
+          </a:p>
+        </p:txBody>
+      </p:sp>
+      <p:sp>
+        <p:nvSpPr>
+          <p:cNvPr id="12" name="文字方塊 11">
+            <a:extLst>
+              <a:ext uri="{FF2B5EF4-FFF2-40B4-BE49-F238E27FC236}">
+                <a16:creationId xmlns:a16="http://schemas.microsoft.com/office/drawing/2014/main" id="{14221F38-C38C-4AE0-84CC-63BDF274C4A3}"/>
+              </a:ext>
+            </a:extLst>
+          </p:cNvPr>
+          <p:cNvSpPr txBox="1"/>
+          <p:nvPr/>
+        </p:nvSpPr>
+        <p:spPr>
+          <a:xfrm>
+            <a:off x="838200" y="2518270"/>
+            <a:ext cx="7552174" cy="1569660"/>
+          </a:xfrm>
+          <a:prstGeom prst="rect">
+            <a:avLst/>
+          </a:prstGeom>
+          <a:noFill/>
+        </p:spPr>
+        <p:txBody>
+          <a:bodyPr wrap="square">
+            <a:spAutoFit/>
+          </a:bodyPr>
+          <a:lstStyle/>
+          <a:p>
+            <a:r>
+              <a:rPr lang="en-US" sz="1600" dirty="0">
+                <a:latin typeface="Consolas" panose="020B0609020204030204" pitchFamily="49" charset="0"/>
+              </a:rPr>
+              <a:t> id  event feature  sensitivity     </a:t>
+            </a:r>
+            <a:r>
+              <a:rPr lang="en-US" sz="1600" dirty="0" err="1">
+                <a:latin typeface="Consolas" panose="020B0609020204030204" pitchFamily="49" charset="0"/>
+              </a:rPr>
+              <a:t>fpr</a:t>
+            </a:r>
+            <a:r>
+              <a:rPr lang="en-US" sz="1600" dirty="0">
+                <a:latin typeface="Consolas" panose="020B0609020204030204" pitchFamily="49" charset="0"/>
+              </a:rPr>
+              <a:t>  </a:t>
+            </a:r>
+            <a:r>
+              <a:rPr lang="en-US" sz="1600" dirty="0" err="1">
+                <a:latin typeface="Consolas" panose="020B0609020204030204" pitchFamily="49" charset="0"/>
+              </a:rPr>
+              <a:t>threat_score</a:t>
+            </a:r>
+            <a:endParaRPr lang="en-US" sz="1600" dirty="0">
+              <a:latin typeface="Consolas" panose="020B0609020204030204" pitchFamily="49" charset="0"/>
+            </a:endParaRPr>
+          </a:p>
+          <a:p>
+            <a:r>
+              <a:rPr lang="en-US" sz="1600" dirty="0">
+                <a:latin typeface="Consolas" panose="020B0609020204030204" pitchFamily="49" charset="0"/>
+              </a:rPr>
+              <a:t>0   PCA-NWPTC  NWPTC     PCA         0.68  0.1700        0.5746</a:t>
+            </a:r>
+          </a:p>
+          <a:p>
+            <a:r>
+              <a:rPr lang="en-US" sz="1600" dirty="0">
+                <a:latin typeface="Consolas" panose="020B0609020204030204" pitchFamily="49" charset="0"/>
+              </a:rPr>
+              <a:t>1   CAE-NWPTC  NWPTC     CAE         0.70  0.1871        0.5824</a:t>
+            </a:r>
+          </a:p>
+          <a:p>
+            <a:r>
+              <a:rPr lang="en-US" sz="1600" dirty="0">
+                <a:latin typeface="Consolas" panose="020B0609020204030204" pitchFamily="49" charset="0"/>
+              </a:rPr>
+              <a:t>2  CVAE-NWPTC  NWPTC    CVAE         0.50  0.4980        0.3252</a:t>
+            </a:r>
+          </a:p>
+          <a:p>
+            <a:r>
+              <a:rPr lang="en-US" sz="1600" dirty="0">
+                <a:latin typeface="Consolas" panose="020B0609020204030204" pitchFamily="49" charset="0"/>
+              </a:rPr>
+              <a:t>3  PTBE-NWPTC  NWPTC    PTBE         0.71  0.2253        0.5651</a:t>
+            </a:r>
+          </a:p>
+          <a:p>
+            <a:r>
+              <a:rPr lang="en-US" sz="1600" dirty="0">
+                <a:latin typeface="Consolas" panose="020B0609020204030204" pitchFamily="49" charset="0"/>
+              </a:rPr>
+              <a:t>4  </a:t>
+            </a:r>
+            <a:r>
+              <a:rPr lang="en-US" sz="1600" dirty="0">
+                <a:highlight>
+                  <a:srgbClr val="FFFF00"/>
+                </a:highlight>
+                <a:latin typeface="Consolas" panose="020B0609020204030204" pitchFamily="49" charset="0"/>
+              </a:rPr>
+              <a:t>PTIN-NWPTC  NWPTC    PTIN         0.77  0.1383        </a:t>
+            </a:r>
+            <a:r>
+              <a:rPr lang="en-US" sz="1600" b="1" dirty="0">
+                <a:highlight>
+                  <a:srgbClr val="FFFF00"/>
+                </a:highlight>
+                <a:latin typeface="Consolas" panose="020B0609020204030204" pitchFamily="49" charset="0"/>
+              </a:rPr>
+              <a:t>0.6650</a:t>
+            </a:r>
+          </a:p>
+        </p:txBody>
+      </p:sp>
+      <p:sp>
+        <p:nvSpPr>
+          <p:cNvPr id="14" name="文字方塊 13">
+            <a:extLst>
+              <a:ext uri="{FF2B5EF4-FFF2-40B4-BE49-F238E27FC236}">
+                <a16:creationId xmlns:a16="http://schemas.microsoft.com/office/drawing/2014/main" id="{FEAE8936-DBAA-4684-8CA1-551F24CFC435}"/>
+              </a:ext>
+            </a:extLst>
+          </p:cNvPr>
+          <p:cNvSpPr txBox="1"/>
+          <p:nvPr/>
+        </p:nvSpPr>
+        <p:spPr>
+          <a:xfrm>
+            <a:off x="838199" y="4591331"/>
+            <a:ext cx="7552174" cy="1569660"/>
+          </a:xfrm>
+          <a:prstGeom prst="rect">
+            <a:avLst/>
+          </a:prstGeom>
+          <a:noFill/>
+        </p:spPr>
+        <p:txBody>
+          <a:bodyPr wrap="square">
+            <a:spAutoFit/>
+          </a:bodyPr>
+          <a:lstStyle/>
+          <a:p>
+            <a:r>
+              <a:rPr lang="en-US" sz="1600" dirty="0">
+                <a:latin typeface="Consolas" panose="020B0609020204030204" pitchFamily="49" charset="0"/>
+              </a:rPr>
+              <a:t> id  event feature  sensitivity     </a:t>
+            </a:r>
+            <a:r>
+              <a:rPr lang="en-US" sz="1600" dirty="0" err="1">
+                <a:latin typeface="Consolas" panose="020B0609020204030204" pitchFamily="49" charset="0"/>
+              </a:rPr>
+              <a:t>fpr</a:t>
+            </a:r>
+            <a:r>
+              <a:rPr lang="en-US" sz="1600" dirty="0">
+                <a:latin typeface="Consolas" panose="020B0609020204030204" pitchFamily="49" charset="0"/>
+              </a:rPr>
+              <a:t>  </a:t>
+            </a:r>
+            <a:r>
+              <a:rPr lang="en-US" sz="1600" dirty="0" err="1">
+                <a:latin typeface="Consolas" panose="020B0609020204030204" pitchFamily="49" charset="0"/>
+              </a:rPr>
+              <a:t>threat_score</a:t>
+            </a:r>
+            <a:endParaRPr lang="en-US" sz="1600" dirty="0">
+              <a:latin typeface="Consolas" panose="020B0609020204030204" pitchFamily="49" charset="0"/>
+            </a:endParaRPr>
+          </a:p>
+          <a:p>
+            <a:r>
+              <a:rPr lang="en-US" sz="1600" dirty="0">
+                <a:latin typeface="Consolas" panose="020B0609020204030204" pitchFamily="49" charset="0"/>
+              </a:rPr>
+              <a:t>0   PCA-NWPTC  NWPTC     PCA         0.68  0.1897        0.5642</a:t>
+            </a:r>
+          </a:p>
+          <a:p>
+            <a:r>
+              <a:rPr lang="en-US" sz="1600" dirty="0">
+                <a:latin typeface="Consolas" panose="020B0609020204030204" pitchFamily="49" charset="0"/>
+              </a:rPr>
+              <a:t>1   CAE-NWPTC  NWPTC     CAE         0.70  0.1871        0.5788</a:t>
+            </a:r>
+          </a:p>
+          <a:p>
+            <a:r>
+              <a:rPr lang="en-US" sz="1600" dirty="0">
+                <a:latin typeface="Consolas" panose="020B0609020204030204" pitchFamily="49" charset="0"/>
+              </a:rPr>
+              <a:t>2  CVAE-NWPTC  NWPTC    CVAE         0.49  0.4585        0.3259</a:t>
+            </a:r>
+          </a:p>
+          <a:p>
+            <a:r>
+              <a:rPr lang="en-US" sz="1600" dirty="0">
+                <a:latin typeface="Consolas" panose="020B0609020204030204" pitchFamily="49" charset="0"/>
+              </a:rPr>
+              <a:t>3  PTBE-NWPTC  NWPTC    PTBE         0.70  0.2767        0.5362</a:t>
+            </a:r>
+          </a:p>
+          <a:p>
+            <a:r>
+              <a:rPr lang="en-US" sz="1600" dirty="0">
+                <a:latin typeface="Consolas" panose="020B0609020204030204" pitchFamily="49" charset="0"/>
+              </a:rPr>
+              <a:t>4  </a:t>
+            </a:r>
+            <a:r>
+              <a:rPr lang="en-US" sz="1600" dirty="0">
+                <a:highlight>
+                  <a:srgbClr val="FFFF00"/>
+                </a:highlight>
+                <a:latin typeface="Consolas" panose="020B0609020204030204" pitchFamily="49" charset="0"/>
+              </a:rPr>
+              <a:t>PTIN-NWPTC  NWPTC    PTIN         0.77  0.1423        </a:t>
+            </a:r>
+            <a:r>
+              <a:rPr lang="en-US" sz="1600" b="1" dirty="0">
+                <a:highlight>
+                  <a:srgbClr val="FFFF00"/>
+                </a:highlight>
+                <a:latin typeface="Consolas" panose="020B0609020204030204" pitchFamily="49" charset="0"/>
+              </a:rPr>
+              <a:t>0.6675</a:t>
+            </a:r>
+          </a:p>
+        </p:txBody>
+      </p:sp>
+      <p:sp>
+        <p:nvSpPr>
+          <p:cNvPr id="18" name="矩形: 圓角 17">
+            <a:extLst>
+              <a:ext uri="{FF2B5EF4-FFF2-40B4-BE49-F238E27FC236}">
+                <a16:creationId xmlns:a16="http://schemas.microsoft.com/office/drawing/2014/main" id="{A9C5098A-F708-4510-A2C7-536F5B488CD0}"/>
+              </a:ext>
+            </a:extLst>
+          </p:cNvPr>
+          <p:cNvSpPr/>
+          <p:nvPr/>
+        </p:nvSpPr>
+        <p:spPr>
+          <a:xfrm>
+            <a:off x="838199" y="2095749"/>
+            <a:ext cx="1465834" cy="422521"/>
+          </a:xfrm>
+          <a:prstGeom prst="roundRect">
+            <a:avLst/>
+          </a:prstGeom>
+        </p:spPr>
+        <p:style>
+          <a:lnRef idx="2">
+            <a:schemeClr val="accent1">
+              <a:shade val="50000"/>
+            </a:schemeClr>
+          </a:lnRef>
+          <a:fillRef idx="1">
+            <a:schemeClr val="accent1"/>
+          </a:fillRef>
+          <a:effectRef idx="0">
+            <a:schemeClr val="accent1"/>
+          </a:effectRef>
+          <a:fontRef idx="minor">
+            <a:schemeClr val="lt1"/>
+          </a:fontRef>
+        </p:style>
+        <p:txBody>
+          <a:bodyPr rtlCol="0" anchor="ctr"/>
+          <a:lstStyle/>
+          <a:p>
+            <a:pPr algn="ctr"/>
+            <a:r>
+              <a:rPr lang="en-US" dirty="0"/>
+              <a:t>256x256</a:t>
+            </a:r>
+          </a:p>
+        </p:txBody>
+      </p:sp>
+      <p:sp>
+        <p:nvSpPr>
+          <p:cNvPr id="19" name="矩形: 圓角 18">
+            <a:extLst>
+              <a:ext uri="{FF2B5EF4-FFF2-40B4-BE49-F238E27FC236}">
+                <a16:creationId xmlns:a16="http://schemas.microsoft.com/office/drawing/2014/main" id="{07894ACD-8097-43E0-AFD2-4FBD783C8D92}"/>
+              </a:ext>
+            </a:extLst>
+          </p:cNvPr>
+          <p:cNvSpPr/>
+          <p:nvPr/>
+        </p:nvSpPr>
+        <p:spPr>
+          <a:xfrm>
+            <a:off x="838199" y="4168810"/>
+            <a:ext cx="1465834" cy="422521"/>
+          </a:xfrm>
+          <a:prstGeom prst="roundRect">
+            <a:avLst/>
+          </a:prstGeom>
+        </p:spPr>
+        <p:style>
+          <a:lnRef idx="2">
+            <a:schemeClr val="accent1">
+              <a:shade val="50000"/>
+            </a:schemeClr>
+          </a:lnRef>
+          <a:fillRef idx="1">
+            <a:schemeClr val="accent1"/>
+          </a:fillRef>
+          <a:effectRef idx="0">
+            <a:schemeClr val="accent1"/>
+          </a:effectRef>
+          <a:fontRef idx="minor">
+            <a:schemeClr val="lt1"/>
+          </a:fontRef>
+        </p:style>
+        <p:txBody>
+          <a:bodyPr rtlCol="0" anchor="ctr"/>
+          <a:lstStyle/>
+          <a:p>
+            <a:pPr algn="ctr"/>
+            <a:r>
+              <a:rPr lang="en-US" dirty="0"/>
+              <a:t>512x512</a:t>
+            </a:r>
+          </a:p>
+        </p:txBody>
+      </p:sp>
+      <p:sp>
+        <p:nvSpPr>
+          <p:cNvPr id="7" name="矩形 6">
+            <a:extLst>
+              <a:ext uri="{FF2B5EF4-FFF2-40B4-BE49-F238E27FC236}">
+                <a16:creationId xmlns:a16="http://schemas.microsoft.com/office/drawing/2014/main" id="{BB1D1276-351B-4B8B-AF94-67A1B303BD4E}"/>
+              </a:ext>
+            </a:extLst>
+          </p:cNvPr>
+          <p:cNvSpPr/>
+          <p:nvPr/>
+        </p:nvSpPr>
+        <p:spPr>
+          <a:xfrm>
+            <a:off x="838199" y="1592344"/>
+            <a:ext cx="10515600" cy="422521"/>
+          </a:xfrm>
+          <a:prstGeom prst="rect">
+            <a:avLst/>
+          </a:prstGeom>
+          <a:solidFill>
+            <a:schemeClr val="accent5"/>
+          </a:solidFill>
+          <a:ln>
+            <a:noFill/>
+          </a:ln>
+        </p:spPr>
+        <p:style>
+          <a:lnRef idx="0">
+            <a:scrgbClr r="0" g="0" b="0"/>
+          </a:lnRef>
+          <a:fillRef idx="0">
+            <a:scrgbClr r="0" g="0" b="0"/>
+          </a:fillRef>
+          <a:effectRef idx="0">
+            <a:scrgbClr r="0" g="0" b="0"/>
+          </a:effectRef>
+          <a:fontRef idx="minor">
+            <a:schemeClr val="lt1"/>
+          </a:fontRef>
+        </p:style>
+        <p:txBody>
+          <a:bodyPr rtlCol="0" anchor="ctr"/>
+          <a:lstStyle/>
+          <a:p>
+            <a:r>
+              <a:rPr lang="en-US" dirty="0"/>
+              <a:t>Definition: JTWC best track</a:t>
+            </a:r>
+          </a:p>
+        </p:txBody>
+      </p:sp>
+    </p:spTree>
+    <p:extLst>
+      <p:ext uri="{BB962C8B-B14F-4D97-AF65-F5344CB8AC3E}">
+        <p14:creationId xmlns:p14="http://schemas.microsoft.com/office/powerpoint/2010/main" val="3586112917"/>
+      </p:ext>
+    </p:extLst>
+  </p:cSld>
+  <p:clrMapOvr>
+    <a:masterClrMapping/>
+  </p:clrMapOvr>
+</p:sld>
+</file>
+
+<file path=ppt/slides/slide18.xml><?xml version="1.0" encoding="utf-8"?>
+<p:sld xmlns:a="http://schemas.openxmlformats.org/drawingml/2006/main" xmlns:r="http://schemas.openxmlformats.org/officeDocument/2006/relationships" xmlns:p="http://schemas.openxmlformats.org/presentationml/2006/main">
+  <p:cSld>
+    <p:spTree>
+      <p:nvGrpSpPr>
+        <p:cNvPr id="1" name=""/>
+        <p:cNvGrpSpPr/>
+        <p:nvPr/>
+      </p:nvGrpSpPr>
+      <p:grpSpPr>
+        <a:xfrm>
+          <a:off x="0" y="0"/>
+          <a:ext cx="0" cy="0"/>
+          <a:chOff x="0" y="0"/>
+          <a:chExt cx="0" cy="0"/>
+        </a:xfrm>
+      </p:grpSpPr>
+      <p:sp>
+        <p:nvSpPr>
+          <p:cNvPr id="2" name="Title 1">
+            <a:extLst>
+              <a:ext uri="{FF2B5EF4-FFF2-40B4-BE49-F238E27FC236}">
+                <a16:creationId xmlns:a16="http://schemas.microsoft.com/office/drawing/2014/main" id="{5993A627-EF9A-469E-A138-91301DA13DEF}"/>
+              </a:ext>
+            </a:extLst>
+          </p:cNvPr>
+          <p:cNvSpPr>
+            <a:spLocks noGrp="1"/>
+          </p:cNvSpPr>
+          <p:nvPr>
+            <p:ph type="title"/>
+          </p:nvPr>
+        </p:nvSpPr>
+        <p:spPr/>
+        <p:txBody>
+          <a:bodyPr/>
+          <a:lstStyle/>
+          <a:p>
+            <a:r>
+              <a:rPr lang="en-US" b="1" dirty="0">
+                <a:effectLst>
+                  <a:outerShdw blurRad="38100" dist="38100" dir="2700000" algn="tl">
+                    <a:srgbClr val="000000">
+                      <a:alpha val="43137"/>
+                    </a:srgbClr>
+                  </a:outerShdw>
+                </a:effectLst>
+              </a:rPr>
+              <a:t>FT</a:t>
+            </a:r>
+          </a:p>
+        </p:txBody>
+      </p:sp>
+      <p:sp>
+        <p:nvSpPr>
+          <p:cNvPr id="12" name="文字方塊 11">
+            <a:extLst>
+              <a:ext uri="{FF2B5EF4-FFF2-40B4-BE49-F238E27FC236}">
+                <a16:creationId xmlns:a16="http://schemas.microsoft.com/office/drawing/2014/main" id="{14221F38-C38C-4AE0-84CC-63BDF274C4A3}"/>
+              </a:ext>
+            </a:extLst>
+          </p:cNvPr>
+          <p:cNvSpPr txBox="1"/>
+          <p:nvPr/>
+        </p:nvSpPr>
+        <p:spPr>
+          <a:xfrm>
+            <a:off x="838200" y="2508220"/>
+            <a:ext cx="7552174" cy="1569660"/>
+          </a:xfrm>
+          <a:prstGeom prst="rect">
+            <a:avLst/>
+          </a:prstGeom>
+          <a:noFill/>
+        </p:spPr>
+        <p:txBody>
+          <a:bodyPr wrap="square">
+            <a:spAutoFit/>
+          </a:bodyPr>
+          <a:lstStyle/>
+          <a:p>
+            <a:r>
+              <a:rPr lang="en-US" sz="1600" dirty="0">
+                <a:latin typeface="Consolas" panose="020B0609020204030204" pitchFamily="49" charset="0"/>
+              </a:rPr>
+              <a:t> id event feature  sensitivity     </a:t>
+            </a:r>
+            <a:r>
+              <a:rPr lang="en-US" sz="1600" dirty="0" err="1">
+                <a:latin typeface="Consolas" panose="020B0609020204030204" pitchFamily="49" charset="0"/>
+              </a:rPr>
+              <a:t>fpr</a:t>
+            </a:r>
+            <a:r>
+              <a:rPr lang="en-US" sz="1600" dirty="0">
+                <a:latin typeface="Consolas" panose="020B0609020204030204" pitchFamily="49" charset="0"/>
+              </a:rPr>
+              <a:t>  </a:t>
+            </a:r>
+            <a:r>
+              <a:rPr lang="en-US" sz="1600" dirty="0" err="1">
+                <a:latin typeface="Consolas" panose="020B0609020204030204" pitchFamily="49" charset="0"/>
+              </a:rPr>
+              <a:t>threat_score</a:t>
+            </a:r>
+            <a:endParaRPr lang="en-US" sz="1600" dirty="0">
+              <a:latin typeface="Consolas" panose="020B0609020204030204" pitchFamily="49" charset="0"/>
+            </a:endParaRPr>
+          </a:p>
+          <a:p>
+            <a:r>
+              <a:rPr lang="en-US" sz="1600" dirty="0">
+                <a:highlight>
+                  <a:srgbClr val="FFFF00"/>
+                </a:highlight>
+                <a:latin typeface="Consolas" panose="020B0609020204030204" pitchFamily="49" charset="0"/>
+              </a:rPr>
+              <a:t>0   PCA-FT    FT     PCA         0.66  0.2473        0.2937</a:t>
+            </a:r>
+          </a:p>
+          <a:p>
+            <a:r>
+              <a:rPr lang="en-US" sz="1600" dirty="0">
+                <a:latin typeface="Consolas" panose="020B0609020204030204" pitchFamily="49" charset="0"/>
+              </a:rPr>
+              <a:t>1   CAE-FT    FT     CAE         0.63  0.1969        </a:t>
+            </a:r>
+            <a:r>
+              <a:rPr lang="en-US" sz="1600" b="1" dirty="0">
+                <a:latin typeface="Consolas" panose="020B0609020204030204" pitchFamily="49" charset="0"/>
+              </a:rPr>
+              <a:t>0.3145</a:t>
+            </a:r>
+          </a:p>
+          <a:p>
+            <a:r>
+              <a:rPr lang="en-US" sz="1600" dirty="0">
+                <a:latin typeface="Consolas" panose="020B0609020204030204" pitchFamily="49" charset="0"/>
+              </a:rPr>
+              <a:t>2  CVAE-FT    FT    CVAE         0.42  0.3325        0.1576</a:t>
+            </a:r>
+          </a:p>
+          <a:p>
+            <a:r>
+              <a:rPr lang="en-US" sz="1600" dirty="0">
+                <a:latin typeface="Consolas" panose="020B0609020204030204" pitchFamily="49" charset="0"/>
+              </a:rPr>
+              <a:t>3  PTBE-FT    FT    PTBE         0.56  0.3433        0.2034</a:t>
+            </a:r>
+          </a:p>
+          <a:p>
+            <a:r>
+              <a:rPr lang="en-US" sz="1600" dirty="0">
+                <a:latin typeface="Consolas" panose="020B0609020204030204" pitchFamily="49" charset="0"/>
+              </a:rPr>
+              <a:t>4  PTIN-FT    FT    PTIN         0.63  0.2804        0.2595</a:t>
+            </a:r>
+          </a:p>
+        </p:txBody>
+      </p:sp>
+      <p:sp>
+        <p:nvSpPr>
+          <p:cNvPr id="14" name="文字方塊 13">
+            <a:extLst>
+              <a:ext uri="{FF2B5EF4-FFF2-40B4-BE49-F238E27FC236}">
+                <a16:creationId xmlns:a16="http://schemas.microsoft.com/office/drawing/2014/main" id="{FEAE8936-DBAA-4684-8CA1-551F24CFC435}"/>
+              </a:ext>
+            </a:extLst>
+          </p:cNvPr>
+          <p:cNvSpPr txBox="1"/>
+          <p:nvPr/>
+        </p:nvSpPr>
+        <p:spPr>
+          <a:xfrm>
+            <a:off x="838199" y="4591331"/>
+            <a:ext cx="7552174" cy="1569660"/>
+          </a:xfrm>
+          <a:prstGeom prst="rect">
+            <a:avLst/>
+          </a:prstGeom>
+          <a:noFill/>
+        </p:spPr>
+        <p:txBody>
+          <a:bodyPr wrap="square">
+            <a:spAutoFit/>
+          </a:bodyPr>
+          <a:lstStyle/>
+          <a:p>
+            <a:r>
+              <a:rPr lang="en-US" sz="1600" dirty="0">
+                <a:latin typeface="Consolas" panose="020B0609020204030204" pitchFamily="49" charset="0"/>
+              </a:rPr>
+              <a:t> id event feature  sensitivity     </a:t>
+            </a:r>
+            <a:r>
+              <a:rPr lang="en-US" sz="1600" dirty="0" err="1">
+                <a:latin typeface="Consolas" panose="020B0609020204030204" pitchFamily="49" charset="0"/>
+              </a:rPr>
+              <a:t>fpr</a:t>
+            </a:r>
+            <a:r>
+              <a:rPr lang="en-US" sz="1600" dirty="0">
+                <a:latin typeface="Consolas" panose="020B0609020204030204" pitchFamily="49" charset="0"/>
+              </a:rPr>
+              <a:t>  </a:t>
+            </a:r>
+            <a:r>
+              <a:rPr lang="en-US" sz="1600" dirty="0" err="1">
+                <a:latin typeface="Consolas" panose="020B0609020204030204" pitchFamily="49" charset="0"/>
+              </a:rPr>
+              <a:t>threat_score</a:t>
+            </a:r>
+            <a:endParaRPr lang="en-US" sz="1600" dirty="0">
+              <a:latin typeface="Consolas" panose="020B0609020204030204" pitchFamily="49" charset="0"/>
+            </a:endParaRPr>
+          </a:p>
+          <a:p>
+            <a:r>
+              <a:rPr lang="en-US" sz="1600" dirty="0">
+                <a:latin typeface="Consolas" panose="020B0609020204030204" pitchFamily="49" charset="0"/>
+              </a:rPr>
+              <a:t>0   PCA-FT    FT     PCA         0.62  0.2407        0.2792</a:t>
+            </a:r>
+          </a:p>
+          <a:p>
+            <a:r>
+              <a:rPr lang="en-US" sz="1600" dirty="0">
+                <a:highlight>
+                  <a:srgbClr val="FFFF00"/>
+                </a:highlight>
+                <a:latin typeface="Consolas" panose="020B0609020204030204" pitchFamily="49" charset="0"/>
+              </a:rPr>
+              <a:t>1   CAE-FT    FT     CAE         0.67  0.2026        </a:t>
+            </a:r>
+            <a:r>
+              <a:rPr lang="en-US" sz="1600" b="1" dirty="0">
+                <a:highlight>
+                  <a:srgbClr val="FFFF00"/>
+                </a:highlight>
+                <a:latin typeface="Consolas" panose="020B0609020204030204" pitchFamily="49" charset="0"/>
+              </a:rPr>
+              <a:t>0.3285</a:t>
+            </a:r>
+          </a:p>
+          <a:p>
+            <a:r>
+              <a:rPr lang="en-US" sz="1600" dirty="0">
+                <a:latin typeface="Consolas" panose="020B0609020204030204" pitchFamily="49" charset="0"/>
+              </a:rPr>
+              <a:t>2  CVAE-FT    FT    CVAE         0.34  0.3648        0.1206</a:t>
+            </a:r>
+          </a:p>
+          <a:p>
+            <a:r>
+              <a:rPr lang="en-US" sz="1600" dirty="0">
+                <a:latin typeface="Consolas" panose="020B0609020204030204" pitchFamily="49" charset="0"/>
+              </a:rPr>
+              <a:t>3  PTBE-FT    FT    PTBE         0.59  0.3681        0.2061</a:t>
+            </a:r>
+          </a:p>
+          <a:p>
+            <a:r>
+              <a:rPr lang="en-US" sz="1600" dirty="0">
+                <a:latin typeface="Consolas" panose="020B0609020204030204" pitchFamily="49" charset="0"/>
+              </a:rPr>
+              <a:t>4  PTIN-FT    FT    PTIN         0.62  0.3317        0.2312</a:t>
+            </a:r>
+            <a:endParaRPr lang="en-US" sz="1600" dirty="0">
+              <a:highlight>
+                <a:srgbClr val="FFFF00"/>
+              </a:highlight>
+              <a:latin typeface="Consolas" panose="020B0609020204030204" pitchFamily="49" charset="0"/>
+            </a:endParaRPr>
+          </a:p>
+        </p:txBody>
+      </p:sp>
+      <p:sp>
+        <p:nvSpPr>
+          <p:cNvPr id="18" name="矩形: 圓角 17">
+            <a:extLst>
+              <a:ext uri="{FF2B5EF4-FFF2-40B4-BE49-F238E27FC236}">
+                <a16:creationId xmlns:a16="http://schemas.microsoft.com/office/drawing/2014/main" id="{A9C5098A-F708-4510-A2C7-536F5B488CD0}"/>
+              </a:ext>
+            </a:extLst>
+          </p:cNvPr>
+          <p:cNvSpPr/>
+          <p:nvPr/>
+        </p:nvSpPr>
+        <p:spPr>
+          <a:xfrm>
+            <a:off x="838199" y="2085699"/>
+            <a:ext cx="1465834" cy="422521"/>
+          </a:xfrm>
+          <a:prstGeom prst="roundRect">
+            <a:avLst/>
+          </a:prstGeom>
+        </p:spPr>
+        <p:style>
+          <a:lnRef idx="2">
+            <a:schemeClr val="accent1">
+              <a:shade val="50000"/>
+            </a:schemeClr>
+          </a:lnRef>
+          <a:fillRef idx="1">
+            <a:schemeClr val="accent1"/>
+          </a:fillRef>
+          <a:effectRef idx="0">
+            <a:schemeClr val="accent1"/>
+          </a:effectRef>
+          <a:fontRef idx="minor">
+            <a:schemeClr val="lt1"/>
+          </a:fontRef>
+        </p:style>
+        <p:txBody>
+          <a:bodyPr rtlCol="0" anchor="ctr"/>
+          <a:lstStyle/>
+          <a:p>
+            <a:pPr algn="ctr"/>
+            <a:r>
+              <a:rPr lang="en-US" dirty="0"/>
+              <a:t>256x256</a:t>
+            </a:r>
+          </a:p>
+        </p:txBody>
+      </p:sp>
+      <p:sp>
+        <p:nvSpPr>
+          <p:cNvPr id="19" name="矩形: 圓角 18">
+            <a:extLst>
+              <a:ext uri="{FF2B5EF4-FFF2-40B4-BE49-F238E27FC236}">
+                <a16:creationId xmlns:a16="http://schemas.microsoft.com/office/drawing/2014/main" id="{07894ACD-8097-43E0-AFD2-4FBD783C8D92}"/>
+              </a:ext>
+            </a:extLst>
+          </p:cNvPr>
+          <p:cNvSpPr/>
+          <p:nvPr/>
+        </p:nvSpPr>
+        <p:spPr>
+          <a:xfrm>
+            <a:off x="838199" y="4168810"/>
+            <a:ext cx="1465834" cy="422521"/>
+          </a:xfrm>
+          <a:prstGeom prst="roundRect">
+            <a:avLst/>
+          </a:prstGeom>
+        </p:spPr>
+        <p:style>
+          <a:lnRef idx="2">
+            <a:schemeClr val="accent1">
+              <a:shade val="50000"/>
+            </a:schemeClr>
+          </a:lnRef>
+          <a:fillRef idx="1">
+            <a:schemeClr val="accent1"/>
+          </a:fillRef>
+          <a:effectRef idx="0">
+            <a:schemeClr val="accent1"/>
+          </a:effectRef>
+          <a:fontRef idx="minor">
+            <a:schemeClr val="lt1"/>
+          </a:fontRef>
+        </p:style>
+        <p:txBody>
+          <a:bodyPr rtlCol="0" anchor="ctr"/>
+          <a:lstStyle/>
+          <a:p>
+            <a:pPr algn="ctr"/>
+            <a:r>
+              <a:rPr lang="en-US" dirty="0"/>
+              <a:t>512x512</a:t>
+            </a:r>
+          </a:p>
+        </p:txBody>
+      </p:sp>
+      <p:sp>
+        <p:nvSpPr>
+          <p:cNvPr id="7" name="矩形 6">
+            <a:extLst>
+              <a:ext uri="{FF2B5EF4-FFF2-40B4-BE49-F238E27FC236}">
+                <a16:creationId xmlns:a16="http://schemas.microsoft.com/office/drawing/2014/main" id="{7C293CE3-62BA-4445-931C-E97C8D447A5B}"/>
+              </a:ext>
+            </a:extLst>
+          </p:cNvPr>
+          <p:cNvSpPr/>
+          <p:nvPr/>
+        </p:nvSpPr>
+        <p:spPr>
+          <a:xfrm>
+            <a:off x="838199" y="1592344"/>
+            <a:ext cx="10515600" cy="422521"/>
+          </a:xfrm>
+          <a:prstGeom prst="rect">
+            <a:avLst/>
+          </a:prstGeom>
+          <a:solidFill>
+            <a:schemeClr val="accent5"/>
+          </a:solidFill>
+          <a:ln>
+            <a:noFill/>
+          </a:ln>
+        </p:spPr>
+        <p:style>
+          <a:lnRef idx="0">
+            <a:scrgbClr r="0" g="0" b="0"/>
+          </a:lnRef>
+          <a:fillRef idx="0">
+            <a:scrgbClr r="0" g="0" b="0"/>
+          </a:fillRef>
+          <a:effectRef idx="0">
+            <a:scrgbClr r="0" g="0" b="0"/>
+          </a:effectRef>
+          <a:fontRef idx="minor">
+            <a:schemeClr val="lt1"/>
+          </a:fontRef>
+        </p:style>
+        <p:txBody>
+          <a:bodyPr rtlCol="0" anchor="ctr"/>
+          <a:lstStyle/>
+          <a:p>
+            <a:r>
+              <a:rPr lang="en-US" dirty="0"/>
+              <a:t>Definition: CWB weather map (00Z) showed a front over Taiwan area.</a:t>
+            </a:r>
+          </a:p>
+        </p:txBody>
+      </p:sp>
+    </p:spTree>
+    <p:extLst>
+      <p:ext uri="{BB962C8B-B14F-4D97-AF65-F5344CB8AC3E}">
+        <p14:creationId xmlns:p14="http://schemas.microsoft.com/office/powerpoint/2010/main" val="3171106954"/>
+      </p:ext>
+    </p:extLst>
+  </p:cSld>
+  <p:clrMapOvr>
+    <a:masterClrMapping/>
+  </p:clrMapOvr>
+</p:sld>
+</file>
+
+<file path=ppt/slides/slide19.xml><?xml version="1.0" encoding="utf-8"?>
+<p:sld xmlns:a="http://schemas.openxmlformats.org/drawingml/2006/main" xmlns:r="http://schemas.openxmlformats.org/officeDocument/2006/relationships" xmlns:p="http://schemas.openxmlformats.org/presentationml/2006/main">
+  <p:cSld>
+    <p:spTree>
+      <p:nvGrpSpPr>
+        <p:cNvPr id="1" name=""/>
+        <p:cNvGrpSpPr/>
+        <p:nvPr/>
+      </p:nvGrpSpPr>
+      <p:grpSpPr>
+        <a:xfrm>
+          <a:off x="0" y="0"/>
+          <a:ext cx="0" cy="0"/>
+          <a:chOff x="0" y="0"/>
+          <a:chExt cx="0" cy="0"/>
+        </a:xfrm>
+      </p:grpSpPr>
+      <p:sp>
+        <p:nvSpPr>
+          <p:cNvPr id="2" name="Title 1">
+            <a:extLst>
+              <a:ext uri="{FF2B5EF4-FFF2-40B4-BE49-F238E27FC236}">
+                <a16:creationId xmlns:a16="http://schemas.microsoft.com/office/drawing/2014/main" id="{5993A627-EF9A-469E-A138-91301DA13DEF}"/>
+              </a:ext>
+            </a:extLst>
+          </p:cNvPr>
+          <p:cNvSpPr>
+            <a:spLocks noGrp="1"/>
+          </p:cNvSpPr>
+          <p:nvPr>
+            <p:ph type="title"/>
+          </p:nvPr>
+        </p:nvSpPr>
+        <p:spPr/>
+        <p:txBody>
+          <a:bodyPr/>
+          <a:lstStyle/>
+          <a:p>
+            <a:r>
+              <a:rPr lang="en-US" b="1" dirty="0">
+                <a:effectLst>
+                  <a:outerShdw blurRad="38100" dist="38100" dir="2700000" algn="tl">
+                    <a:srgbClr val="000000">
+                      <a:alpha val="43137"/>
+                    </a:srgbClr>
+                  </a:outerShdw>
+                </a:effectLst>
+              </a:rPr>
+              <a:t>NE</a:t>
+            </a:r>
+          </a:p>
+        </p:txBody>
+      </p:sp>
+      <p:sp>
+        <p:nvSpPr>
+          <p:cNvPr id="12" name="文字方塊 11">
+            <a:extLst>
+              <a:ext uri="{FF2B5EF4-FFF2-40B4-BE49-F238E27FC236}">
+                <a16:creationId xmlns:a16="http://schemas.microsoft.com/office/drawing/2014/main" id="{14221F38-C38C-4AE0-84CC-63BDF274C4A3}"/>
+              </a:ext>
+            </a:extLst>
+          </p:cNvPr>
+          <p:cNvSpPr txBox="1"/>
+          <p:nvPr/>
+        </p:nvSpPr>
+        <p:spPr>
+          <a:xfrm>
+            <a:off x="838200" y="2518269"/>
+            <a:ext cx="7552174" cy="1569660"/>
+          </a:xfrm>
+          <a:prstGeom prst="rect">
+            <a:avLst/>
+          </a:prstGeom>
+          <a:noFill/>
+        </p:spPr>
+        <p:txBody>
+          <a:bodyPr wrap="square">
+            <a:spAutoFit/>
+          </a:bodyPr>
+          <a:lstStyle/>
+          <a:p>
+            <a:r>
+              <a:rPr lang="en-US" sz="1600" dirty="0">
+                <a:latin typeface="Consolas" panose="020B0609020204030204" pitchFamily="49" charset="0"/>
+              </a:rPr>
+              <a:t> id event feature  sensitivity     </a:t>
+            </a:r>
+            <a:r>
+              <a:rPr lang="en-US" sz="1600" dirty="0" err="1">
+                <a:latin typeface="Consolas" panose="020B0609020204030204" pitchFamily="49" charset="0"/>
+              </a:rPr>
+              <a:t>fpr</a:t>
+            </a:r>
+            <a:r>
+              <a:rPr lang="en-US" sz="1600" dirty="0">
+                <a:latin typeface="Consolas" panose="020B0609020204030204" pitchFamily="49" charset="0"/>
+              </a:rPr>
+              <a:t>  </a:t>
+            </a:r>
+            <a:r>
+              <a:rPr lang="en-US" sz="1600" dirty="0" err="1">
+                <a:latin typeface="Consolas" panose="020B0609020204030204" pitchFamily="49" charset="0"/>
+              </a:rPr>
+              <a:t>threat_score</a:t>
+            </a:r>
+            <a:endParaRPr lang="en-US" sz="1600" dirty="0">
+              <a:latin typeface="Consolas" panose="020B0609020204030204" pitchFamily="49" charset="0"/>
+            </a:endParaRPr>
+          </a:p>
+          <a:p>
+            <a:r>
+              <a:rPr lang="en-US" sz="1600" dirty="0">
+                <a:highlight>
+                  <a:srgbClr val="FFFF00"/>
+                </a:highlight>
+                <a:latin typeface="Consolas" panose="020B0609020204030204" pitchFamily="49" charset="0"/>
+              </a:rPr>
+              <a:t>0   PCA-NE    NE     PCA         0.78  0.2972        0.4816</a:t>
+            </a:r>
+          </a:p>
+          <a:p>
+            <a:r>
+              <a:rPr lang="en-US" sz="1600" dirty="0">
+                <a:latin typeface="Consolas" panose="020B0609020204030204" pitchFamily="49" charset="0"/>
+              </a:rPr>
+              <a:t>1   CAE-NE    NE     CAE         0.77  0.2768        </a:t>
+            </a:r>
+            <a:r>
+              <a:rPr lang="en-US" sz="1600" b="1" dirty="0">
+                <a:latin typeface="Consolas" panose="020B0609020204030204" pitchFamily="49" charset="0"/>
+              </a:rPr>
+              <a:t>0.4878</a:t>
+            </a:r>
+          </a:p>
+          <a:p>
+            <a:r>
+              <a:rPr lang="en-US" sz="1600" dirty="0">
+                <a:latin typeface="Consolas" panose="020B0609020204030204" pitchFamily="49" charset="0"/>
+              </a:rPr>
+              <a:t>2  CVAE-NE    NE    CVAE         0.45  0.4484        0.2313</a:t>
+            </a:r>
+          </a:p>
+          <a:p>
+            <a:r>
+              <a:rPr lang="en-US" sz="1600" dirty="0">
+                <a:latin typeface="Consolas" panose="020B0609020204030204" pitchFamily="49" charset="0"/>
+              </a:rPr>
+              <a:t>3  PTBE-NE    NE    PTBE         0.68  0.2962        0.4177</a:t>
+            </a:r>
+          </a:p>
+          <a:p>
+            <a:r>
+              <a:rPr lang="en-US" sz="1600" dirty="0">
+                <a:latin typeface="Consolas" panose="020B0609020204030204" pitchFamily="49" charset="0"/>
+              </a:rPr>
+              <a:t>4  PTIN-NE    NE    PTIN         0.74  0.2809        0.4677</a:t>
+            </a:r>
+            <a:endParaRPr lang="en-US" sz="1600" dirty="0">
+              <a:highlight>
+                <a:srgbClr val="FFFF00"/>
+              </a:highlight>
+              <a:latin typeface="Consolas" panose="020B0609020204030204" pitchFamily="49" charset="0"/>
+            </a:endParaRPr>
+          </a:p>
+        </p:txBody>
+      </p:sp>
+      <p:sp>
+        <p:nvSpPr>
+          <p:cNvPr id="14" name="文字方塊 13">
+            <a:extLst>
+              <a:ext uri="{FF2B5EF4-FFF2-40B4-BE49-F238E27FC236}">
+                <a16:creationId xmlns:a16="http://schemas.microsoft.com/office/drawing/2014/main" id="{FEAE8936-DBAA-4684-8CA1-551F24CFC435}"/>
+              </a:ext>
+            </a:extLst>
+          </p:cNvPr>
+          <p:cNvSpPr txBox="1"/>
+          <p:nvPr/>
+        </p:nvSpPr>
+        <p:spPr>
+          <a:xfrm>
+            <a:off x="838199" y="4591331"/>
+            <a:ext cx="7552174" cy="1569660"/>
+          </a:xfrm>
+          <a:prstGeom prst="rect">
+            <a:avLst/>
+          </a:prstGeom>
+          <a:noFill/>
+        </p:spPr>
+        <p:txBody>
+          <a:bodyPr wrap="square">
+            <a:spAutoFit/>
+          </a:bodyPr>
+          <a:lstStyle/>
+          <a:p>
+            <a:r>
+              <a:rPr lang="en-US" sz="1600" dirty="0">
+                <a:latin typeface="Consolas" panose="020B0609020204030204" pitchFamily="49" charset="0"/>
+              </a:rPr>
+              <a:t> id event feature  sensitivity     </a:t>
+            </a:r>
+            <a:r>
+              <a:rPr lang="en-US" sz="1600" dirty="0" err="1">
+                <a:latin typeface="Consolas" panose="020B0609020204030204" pitchFamily="49" charset="0"/>
+              </a:rPr>
+              <a:t>fpr</a:t>
+            </a:r>
+            <a:r>
+              <a:rPr lang="en-US" sz="1600" dirty="0">
+                <a:latin typeface="Consolas" panose="020B0609020204030204" pitchFamily="49" charset="0"/>
+              </a:rPr>
+              <a:t>  </a:t>
+            </a:r>
+            <a:r>
+              <a:rPr lang="en-US" sz="1600" dirty="0" err="1">
+                <a:latin typeface="Consolas" panose="020B0609020204030204" pitchFamily="49" charset="0"/>
+              </a:rPr>
+              <a:t>threat_score</a:t>
+            </a:r>
+            <a:endParaRPr lang="en-US" sz="1600" dirty="0">
+              <a:latin typeface="Consolas" panose="020B0609020204030204" pitchFamily="49" charset="0"/>
+            </a:endParaRPr>
+          </a:p>
+          <a:p>
+            <a:r>
+              <a:rPr lang="en-US" sz="1600" dirty="0">
+                <a:latin typeface="Consolas" panose="020B0609020204030204" pitchFamily="49" charset="0"/>
+              </a:rPr>
+              <a:t>0   PCA-NE    NE     PCA         0.75  0.2952        0.4670</a:t>
+            </a:r>
+          </a:p>
+          <a:p>
+            <a:r>
+              <a:rPr lang="en-US" sz="1600" dirty="0">
+                <a:highlight>
+                  <a:srgbClr val="FFFF00"/>
+                </a:highlight>
+                <a:latin typeface="Consolas" panose="020B0609020204030204" pitchFamily="49" charset="0"/>
+              </a:rPr>
+              <a:t>1   CAE-NE    NE     CAE         0.79  0.2789        </a:t>
+            </a:r>
+            <a:r>
+              <a:rPr lang="en-US" sz="1600" b="1" dirty="0">
+                <a:highlight>
+                  <a:srgbClr val="FFFF00"/>
+                </a:highlight>
+                <a:latin typeface="Consolas" panose="020B0609020204030204" pitchFamily="49" charset="0"/>
+              </a:rPr>
+              <a:t>0.4973</a:t>
+            </a:r>
+          </a:p>
+          <a:p>
+            <a:r>
+              <a:rPr lang="en-US" sz="1600" dirty="0">
+                <a:latin typeface="Consolas" panose="020B0609020204030204" pitchFamily="49" charset="0"/>
+              </a:rPr>
+              <a:t>2  CVAE-NE    NE    CVAE         0.40  0.4688        0.2004</a:t>
+            </a:r>
+          </a:p>
+          <a:p>
+            <a:r>
+              <a:rPr lang="en-US" sz="1600" dirty="0">
+                <a:latin typeface="Consolas" panose="020B0609020204030204" pitchFamily="49" charset="0"/>
+              </a:rPr>
+              <a:t>3  PTBE-NE    NE    PTBE         0.68  0.3095        0.4145</a:t>
+            </a:r>
+          </a:p>
+          <a:p>
+            <a:r>
+              <a:rPr lang="en-US" sz="1600" dirty="0">
+                <a:latin typeface="Consolas" panose="020B0609020204030204" pitchFamily="49" charset="0"/>
+              </a:rPr>
+              <a:t>4  PTIN-NE    NE    PTIN         0.78  0.2809        0.4906</a:t>
+            </a:r>
+            <a:endParaRPr lang="en-US" sz="1600" dirty="0">
+              <a:highlight>
+                <a:srgbClr val="FFFF00"/>
+              </a:highlight>
+              <a:latin typeface="Consolas" panose="020B0609020204030204" pitchFamily="49" charset="0"/>
+            </a:endParaRPr>
+          </a:p>
+        </p:txBody>
+      </p:sp>
+      <p:sp>
+        <p:nvSpPr>
+          <p:cNvPr id="18" name="矩形: 圓角 17">
+            <a:extLst>
+              <a:ext uri="{FF2B5EF4-FFF2-40B4-BE49-F238E27FC236}">
+                <a16:creationId xmlns:a16="http://schemas.microsoft.com/office/drawing/2014/main" id="{A9C5098A-F708-4510-A2C7-536F5B488CD0}"/>
+              </a:ext>
+            </a:extLst>
+          </p:cNvPr>
+          <p:cNvSpPr/>
+          <p:nvPr/>
+        </p:nvSpPr>
+        <p:spPr>
+          <a:xfrm>
+            <a:off x="838199" y="2095748"/>
+            <a:ext cx="1465834" cy="422521"/>
+          </a:xfrm>
+          <a:prstGeom prst="roundRect">
+            <a:avLst/>
+          </a:prstGeom>
+        </p:spPr>
+        <p:style>
+          <a:lnRef idx="2">
+            <a:schemeClr val="accent1">
+              <a:shade val="50000"/>
+            </a:schemeClr>
+          </a:lnRef>
+          <a:fillRef idx="1">
+            <a:schemeClr val="accent1"/>
+          </a:fillRef>
+          <a:effectRef idx="0">
+            <a:schemeClr val="accent1"/>
+          </a:effectRef>
+          <a:fontRef idx="minor">
+            <a:schemeClr val="lt1"/>
+          </a:fontRef>
+        </p:style>
+        <p:txBody>
+          <a:bodyPr rtlCol="0" anchor="ctr"/>
+          <a:lstStyle/>
+          <a:p>
+            <a:pPr algn="ctr"/>
+            <a:r>
+              <a:rPr lang="en-US" dirty="0"/>
+              <a:t>256x256</a:t>
+            </a:r>
+          </a:p>
+        </p:txBody>
+      </p:sp>
+      <p:sp>
+        <p:nvSpPr>
+          <p:cNvPr id="19" name="矩形: 圓角 18">
+            <a:extLst>
+              <a:ext uri="{FF2B5EF4-FFF2-40B4-BE49-F238E27FC236}">
+                <a16:creationId xmlns:a16="http://schemas.microsoft.com/office/drawing/2014/main" id="{07894ACD-8097-43E0-AFD2-4FBD783C8D92}"/>
+              </a:ext>
+            </a:extLst>
+          </p:cNvPr>
+          <p:cNvSpPr/>
+          <p:nvPr/>
+        </p:nvSpPr>
+        <p:spPr>
+          <a:xfrm>
+            <a:off x="838199" y="4168810"/>
+            <a:ext cx="1465834" cy="422521"/>
+          </a:xfrm>
+          <a:prstGeom prst="roundRect">
+            <a:avLst/>
+          </a:prstGeom>
+        </p:spPr>
+        <p:style>
+          <a:lnRef idx="2">
+            <a:schemeClr val="accent1">
+              <a:shade val="50000"/>
+            </a:schemeClr>
+          </a:lnRef>
+          <a:fillRef idx="1">
+            <a:schemeClr val="accent1"/>
+          </a:fillRef>
+          <a:effectRef idx="0">
+            <a:schemeClr val="accent1"/>
+          </a:effectRef>
+          <a:fontRef idx="minor">
+            <a:schemeClr val="lt1"/>
+          </a:fontRef>
+        </p:style>
+        <p:txBody>
+          <a:bodyPr rtlCol="0" anchor="ctr"/>
+          <a:lstStyle/>
+          <a:p>
+            <a:pPr algn="ctr"/>
+            <a:r>
+              <a:rPr lang="en-US" dirty="0"/>
+              <a:t>512x512</a:t>
+            </a:r>
+          </a:p>
+        </p:txBody>
+      </p:sp>
+      <p:sp>
+        <p:nvSpPr>
+          <p:cNvPr id="7" name="矩形 6">
+            <a:extLst>
+              <a:ext uri="{FF2B5EF4-FFF2-40B4-BE49-F238E27FC236}">
+                <a16:creationId xmlns:a16="http://schemas.microsoft.com/office/drawing/2014/main" id="{6C846D7D-FA72-4FC0-9AFF-0277B3CA85BC}"/>
+              </a:ext>
+            </a:extLst>
+          </p:cNvPr>
+          <p:cNvSpPr/>
+          <p:nvPr/>
+        </p:nvSpPr>
+        <p:spPr>
+          <a:xfrm>
+            <a:off x="838199" y="1592344"/>
+            <a:ext cx="10515600" cy="422521"/>
+          </a:xfrm>
+          <a:prstGeom prst="rect">
+            <a:avLst/>
+          </a:prstGeom>
+          <a:solidFill>
+            <a:schemeClr val="accent5"/>
+          </a:solidFill>
+          <a:ln>
+            <a:noFill/>
+          </a:ln>
+        </p:spPr>
+        <p:style>
+          <a:lnRef idx="0">
+            <a:scrgbClr r="0" g="0" b="0"/>
+          </a:lnRef>
+          <a:fillRef idx="0">
+            <a:scrgbClr r="0" g="0" b="0"/>
+          </a:fillRef>
+          <a:effectRef idx="0">
+            <a:scrgbClr r="0" g="0" b="0"/>
+          </a:effectRef>
+          <a:fontRef idx="minor">
+            <a:schemeClr val="lt1"/>
+          </a:fontRef>
+        </p:style>
+        <p:txBody>
+          <a:bodyPr rtlCol="0" anchor="ctr"/>
+          <a:lstStyle/>
+          <a:p>
+            <a:r>
+              <a:rPr lang="en-US" dirty="0"/>
+              <a:t>Definition: the wind profile of </a:t>
+            </a:r>
+            <a:r>
+              <a:rPr lang="en-US" dirty="0" err="1"/>
+              <a:t>Pengjiayu</a:t>
+            </a:r>
+            <a:r>
+              <a:rPr lang="en-US" dirty="0"/>
+              <a:t> Weather Station (</a:t>
+            </a:r>
+            <a:r>
+              <a:rPr lang="zh-TW" altLang="en-US" dirty="0"/>
+              <a:t>彭佳嶼測站</a:t>
+            </a:r>
+            <a:r>
+              <a:rPr lang="en-US" altLang="zh-TW" dirty="0"/>
+              <a:t>) showed north-easterlies</a:t>
+            </a:r>
+            <a:r>
+              <a:rPr lang="en-US" dirty="0"/>
+              <a:t>.</a:t>
+            </a:r>
+          </a:p>
+        </p:txBody>
+      </p:sp>
+    </p:spTree>
+    <p:extLst>
+      <p:ext uri="{BB962C8B-B14F-4D97-AF65-F5344CB8AC3E}">
+        <p14:creationId xmlns:p14="http://schemas.microsoft.com/office/powerpoint/2010/main" val="108676824"/>
       </p:ext>
     </p:extLst>
   </p:cSld>
@@ -6506,6 +7970,551 @@
     <p:extLst>
       <p:ext uri="{BB962C8B-B14F-4D97-AF65-F5344CB8AC3E}">
         <p14:creationId xmlns:p14="http://schemas.microsoft.com/office/powerpoint/2010/main" val="2118177774"/>
+      </p:ext>
+    </p:extLst>
+  </p:cSld>
+  <p:clrMapOvr>
+    <a:masterClrMapping/>
+  </p:clrMapOvr>
+</p:sld>
+</file>
+
+<file path=ppt/slides/slide20.xml><?xml version="1.0" encoding="utf-8"?>
+<p:sld xmlns:a="http://schemas.openxmlformats.org/drawingml/2006/main" xmlns:r="http://schemas.openxmlformats.org/officeDocument/2006/relationships" xmlns:p="http://schemas.openxmlformats.org/presentationml/2006/main">
+  <p:cSld>
+    <p:spTree>
+      <p:nvGrpSpPr>
+        <p:cNvPr id="1" name=""/>
+        <p:cNvGrpSpPr/>
+        <p:nvPr/>
+      </p:nvGrpSpPr>
+      <p:grpSpPr>
+        <a:xfrm>
+          <a:off x="0" y="0"/>
+          <a:ext cx="0" cy="0"/>
+          <a:chOff x="0" y="0"/>
+          <a:chExt cx="0" cy="0"/>
+        </a:xfrm>
+      </p:grpSpPr>
+      <p:sp>
+        <p:nvSpPr>
+          <p:cNvPr id="2" name="Title 1">
+            <a:extLst>
+              <a:ext uri="{FF2B5EF4-FFF2-40B4-BE49-F238E27FC236}">
+                <a16:creationId xmlns:a16="http://schemas.microsoft.com/office/drawing/2014/main" id="{5993A627-EF9A-469E-A138-91301DA13DEF}"/>
+              </a:ext>
+            </a:extLst>
+          </p:cNvPr>
+          <p:cNvSpPr>
+            <a:spLocks noGrp="1"/>
+          </p:cNvSpPr>
+          <p:nvPr>
+            <p:ph type="title"/>
+          </p:nvPr>
+        </p:nvSpPr>
+        <p:spPr/>
+        <p:txBody>
+          <a:bodyPr/>
+          <a:lstStyle/>
+          <a:p>
+            <a:r>
+              <a:rPr lang="en-US" b="1" dirty="0">
+                <a:effectLst>
+                  <a:outerShdw blurRad="38100" dist="38100" dir="2700000" algn="tl">
+                    <a:srgbClr val="000000">
+                      <a:alpha val="43137"/>
+                    </a:srgbClr>
+                  </a:outerShdw>
+                </a:effectLst>
+              </a:rPr>
+              <a:t>SWF</a:t>
+            </a:r>
+          </a:p>
+        </p:txBody>
+      </p:sp>
+      <p:sp>
+        <p:nvSpPr>
+          <p:cNvPr id="12" name="文字方塊 11">
+            <a:extLst>
+              <a:ext uri="{FF2B5EF4-FFF2-40B4-BE49-F238E27FC236}">
+                <a16:creationId xmlns:a16="http://schemas.microsoft.com/office/drawing/2014/main" id="{14221F38-C38C-4AE0-84CC-63BDF274C4A3}"/>
+              </a:ext>
+            </a:extLst>
+          </p:cNvPr>
+          <p:cNvSpPr txBox="1"/>
+          <p:nvPr/>
+        </p:nvSpPr>
+        <p:spPr>
+          <a:xfrm>
+            <a:off x="838200" y="2508230"/>
+            <a:ext cx="7552174" cy="1569660"/>
+          </a:xfrm>
+          <a:prstGeom prst="rect">
+            <a:avLst/>
+          </a:prstGeom>
+          <a:noFill/>
+        </p:spPr>
+        <p:txBody>
+          <a:bodyPr wrap="square">
+            <a:spAutoFit/>
+          </a:bodyPr>
+          <a:lstStyle/>
+          <a:p>
+            <a:r>
+              <a:rPr lang="en-US" sz="1600" dirty="0">
+                <a:latin typeface="Consolas" panose="020B0609020204030204" pitchFamily="49" charset="0"/>
+              </a:rPr>
+              <a:t> id event feature  sensitivity     </a:t>
+            </a:r>
+            <a:r>
+              <a:rPr lang="en-US" sz="1600" dirty="0" err="1">
+                <a:latin typeface="Consolas" panose="020B0609020204030204" pitchFamily="49" charset="0"/>
+              </a:rPr>
+              <a:t>fpr</a:t>
+            </a:r>
+            <a:r>
+              <a:rPr lang="en-US" sz="1600" dirty="0">
+                <a:latin typeface="Consolas" panose="020B0609020204030204" pitchFamily="49" charset="0"/>
+              </a:rPr>
+              <a:t>  </a:t>
+            </a:r>
+            <a:r>
+              <a:rPr lang="en-US" sz="1600" dirty="0" err="1">
+                <a:latin typeface="Consolas" panose="020B0609020204030204" pitchFamily="49" charset="0"/>
+              </a:rPr>
+              <a:t>threat_score</a:t>
+            </a:r>
+            <a:endParaRPr lang="en-US" sz="1600" dirty="0">
+              <a:latin typeface="Consolas" panose="020B0609020204030204" pitchFamily="49" charset="0"/>
+            </a:endParaRPr>
+          </a:p>
+          <a:p>
+            <a:r>
+              <a:rPr lang="en-US" sz="1600" dirty="0">
+                <a:highlight>
+                  <a:srgbClr val="FFFF00"/>
+                </a:highlight>
+                <a:latin typeface="Consolas" panose="020B0609020204030204" pitchFamily="49" charset="0"/>
+              </a:rPr>
+              <a:t>0   PCA-SWF   SWF     PCA         0.92  0.2000        0.5977</a:t>
+            </a:r>
+          </a:p>
+          <a:p>
+            <a:r>
+              <a:rPr lang="en-US" sz="1600" dirty="0">
+                <a:latin typeface="Consolas" panose="020B0609020204030204" pitchFamily="49" charset="0"/>
+              </a:rPr>
+              <a:t>1   CAE-SWF   SWF     CAE         0.89  0.1498        </a:t>
+            </a:r>
+            <a:r>
+              <a:rPr lang="en-US" sz="1600" b="1" dirty="0">
+                <a:latin typeface="Consolas" panose="020B0609020204030204" pitchFamily="49" charset="0"/>
+              </a:rPr>
+              <a:t>0.6370</a:t>
+            </a:r>
+          </a:p>
+          <a:p>
+            <a:r>
+              <a:rPr lang="en-US" sz="1600" dirty="0">
+                <a:latin typeface="Consolas" panose="020B0609020204030204" pitchFamily="49" charset="0"/>
+              </a:rPr>
+              <a:t>2  CVAE-SWF   SWF    CVAE         0.44  0.3820        0.2186</a:t>
+            </a:r>
+          </a:p>
+          <a:p>
+            <a:r>
+              <a:rPr lang="en-US" sz="1600" dirty="0">
+                <a:latin typeface="Consolas" panose="020B0609020204030204" pitchFamily="49" charset="0"/>
+              </a:rPr>
+              <a:t>3  PTBE-SWF   SWF    PTBE         0.88  0.2474        0.5260</a:t>
+            </a:r>
+          </a:p>
+          <a:p>
+            <a:r>
+              <a:rPr lang="en-US" sz="1600" dirty="0">
+                <a:latin typeface="Consolas" panose="020B0609020204030204" pitchFamily="49" charset="0"/>
+              </a:rPr>
+              <a:t>4  PTIN-SWF   SWF    PTIN         0.90  0.1877        0.6007</a:t>
+            </a:r>
+            <a:endParaRPr lang="en-US" sz="1600" dirty="0">
+              <a:highlight>
+                <a:srgbClr val="FFFF00"/>
+              </a:highlight>
+              <a:latin typeface="Consolas" panose="020B0609020204030204" pitchFamily="49" charset="0"/>
+            </a:endParaRPr>
+          </a:p>
+        </p:txBody>
+      </p:sp>
+      <p:sp>
+        <p:nvSpPr>
+          <p:cNvPr id="14" name="文字方塊 13">
+            <a:extLst>
+              <a:ext uri="{FF2B5EF4-FFF2-40B4-BE49-F238E27FC236}">
+                <a16:creationId xmlns:a16="http://schemas.microsoft.com/office/drawing/2014/main" id="{FEAE8936-DBAA-4684-8CA1-551F24CFC435}"/>
+              </a:ext>
+            </a:extLst>
+          </p:cNvPr>
+          <p:cNvSpPr txBox="1"/>
+          <p:nvPr/>
+        </p:nvSpPr>
+        <p:spPr>
+          <a:xfrm>
+            <a:off x="838199" y="4591331"/>
+            <a:ext cx="7552174" cy="1569660"/>
+          </a:xfrm>
+          <a:prstGeom prst="rect">
+            <a:avLst/>
+          </a:prstGeom>
+          <a:noFill/>
+        </p:spPr>
+        <p:txBody>
+          <a:bodyPr wrap="square">
+            <a:spAutoFit/>
+          </a:bodyPr>
+          <a:lstStyle/>
+          <a:p>
+            <a:r>
+              <a:rPr lang="en-US" sz="1600" dirty="0">
+                <a:latin typeface="Consolas" panose="020B0609020204030204" pitchFamily="49" charset="0"/>
+              </a:rPr>
+              <a:t> id event feature  sensitivity     </a:t>
+            </a:r>
+            <a:r>
+              <a:rPr lang="en-US" sz="1600" dirty="0" err="1">
+                <a:latin typeface="Consolas" panose="020B0609020204030204" pitchFamily="49" charset="0"/>
+              </a:rPr>
+              <a:t>fpr</a:t>
+            </a:r>
+            <a:r>
+              <a:rPr lang="en-US" sz="1600" dirty="0">
+                <a:latin typeface="Consolas" panose="020B0609020204030204" pitchFamily="49" charset="0"/>
+              </a:rPr>
+              <a:t>  </a:t>
+            </a:r>
+            <a:r>
+              <a:rPr lang="en-US" sz="1600" dirty="0" err="1">
+                <a:latin typeface="Consolas" panose="020B0609020204030204" pitchFamily="49" charset="0"/>
+              </a:rPr>
+              <a:t>threat_score</a:t>
+            </a:r>
+            <a:endParaRPr lang="en-US" sz="1600" dirty="0">
+              <a:latin typeface="Consolas" panose="020B0609020204030204" pitchFamily="49" charset="0"/>
+            </a:endParaRPr>
+          </a:p>
+          <a:p>
+            <a:r>
+              <a:rPr lang="en-US" sz="1600" dirty="0">
+                <a:latin typeface="Consolas" panose="020B0609020204030204" pitchFamily="49" charset="0"/>
+              </a:rPr>
+              <a:t>0   PCA-SWF   SWF     PCA         0.90  0.1915        0.5966</a:t>
+            </a:r>
+          </a:p>
+          <a:p>
+            <a:r>
+              <a:rPr lang="en-US" sz="1600" dirty="0">
+                <a:latin typeface="Consolas" panose="020B0609020204030204" pitchFamily="49" charset="0"/>
+              </a:rPr>
+              <a:t>1   CAE-SWF   SWF     CAE         0.90  0.1403        </a:t>
+            </a:r>
+            <a:r>
+              <a:rPr lang="en-US" sz="1600" b="1" dirty="0">
+                <a:latin typeface="Consolas" panose="020B0609020204030204" pitchFamily="49" charset="0"/>
+              </a:rPr>
+              <a:t>0.6506</a:t>
+            </a:r>
+          </a:p>
+          <a:p>
+            <a:r>
+              <a:rPr lang="en-US" sz="1600" dirty="0">
+                <a:latin typeface="Consolas" panose="020B0609020204030204" pitchFamily="49" charset="0"/>
+              </a:rPr>
+              <a:t>2  CVAE-SWF   SWF    CVAE         0.41  0.4209        0.1912</a:t>
+            </a:r>
+          </a:p>
+          <a:p>
+            <a:r>
+              <a:rPr lang="en-US" sz="1600" dirty="0">
+                <a:latin typeface="Consolas" panose="020B0609020204030204" pitchFamily="49" charset="0"/>
+              </a:rPr>
+              <a:t>3  PTBE-SWF   SWF    PTBE         0.91  0.2351        0.5585</a:t>
+            </a:r>
+          </a:p>
+          <a:p>
+            <a:r>
+              <a:rPr lang="en-US" sz="1600" dirty="0">
+                <a:highlight>
+                  <a:srgbClr val="FFFF00"/>
+                </a:highlight>
+                <a:latin typeface="Consolas" panose="020B0609020204030204" pitchFamily="49" charset="0"/>
+              </a:rPr>
+              <a:t>4  PTIN-SWF   SWF    PTIN         0.93  0.1848        0.6224</a:t>
+            </a:r>
+          </a:p>
+        </p:txBody>
+      </p:sp>
+      <p:sp>
+        <p:nvSpPr>
+          <p:cNvPr id="18" name="矩形: 圓角 17">
+            <a:extLst>
+              <a:ext uri="{FF2B5EF4-FFF2-40B4-BE49-F238E27FC236}">
+                <a16:creationId xmlns:a16="http://schemas.microsoft.com/office/drawing/2014/main" id="{A9C5098A-F708-4510-A2C7-536F5B488CD0}"/>
+              </a:ext>
+            </a:extLst>
+          </p:cNvPr>
+          <p:cNvSpPr/>
+          <p:nvPr/>
+        </p:nvSpPr>
+        <p:spPr>
+          <a:xfrm>
+            <a:off x="838199" y="2085709"/>
+            <a:ext cx="1465834" cy="422521"/>
+          </a:xfrm>
+          <a:prstGeom prst="roundRect">
+            <a:avLst/>
+          </a:prstGeom>
+        </p:spPr>
+        <p:style>
+          <a:lnRef idx="2">
+            <a:schemeClr val="accent1">
+              <a:shade val="50000"/>
+            </a:schemeClr>
+          </a:lnRef>
+          <a:fillRef idx="1">
+            <a:schemeClr val="accent1"/>
+          </a:fillRef>
+          <a:effectRef idx="0">
+            <a:schemeClr val="accent1"/>
+          </a:effectRef>
+          <a:fontRef idx="minor">
+            <a:schemeClr val="lt1"/>
+          </a:fontRef>
+        </p:style>
+        <p:txBody>
+          <a:bodyPr rtlCol="0" anchor="ctr"/>
+          <a:lstStyle/>
+          <a:p>
+            <a:pPr algn="ctr"/>
+            <a:r>
+              <a:rPr lang="en-US" dirty="0"/>
+              <a:t>256x256</a:t>
+            </a:r>
+          </a:p>
+        </p:txBody>
+      </p:sp>
+      <p:sp>
+        <p:nvSpPr>
+          <p:cNvPr id="19" name="矩形: 圓角 18">
+            <a:extLst>
+              <a:ext uri="{FF2B5EF4-FFF2-40B4-BE49-F238E27FC236}">
+                <a16:creationId xmlns:a16="http://schemas.microsoft.com/office/drawing/2014/main" id="{07894ACD-8097-43E0-AFD2-4FBD783C8D92}"/>
+              </a:ext>
+            </a:extLst>
+          </p:cNvPr>
+          <p:cNvSpPr/>
+          <p:nvPr/>
+        </p:nvSpPr>
+        <p:spPr>
+          <a:xfrm>
+            <a:off x="838199" y="4168810"/>
+            <a:ext cx="1465834" cy="422521"/>
+          </a:xfrm>
+          <a:prstGeom prst="roundRect">
+            <a:avLst/>
+          </a:prstGeom>
+        </p:spPr>
+        <p:style>
+          <a:lnRef idx="2">
+            <a:schemeClr val="accent1">
+              <a:shade val="50000"/>
+            </a:schemeClr>
+          </a:lnRef>
+          <a:fillRef idx="1">
+            <a:schemeClr val="accent1"/>
+          </a:fillRef>
+          <a:effectRef idx="0">
+            <a:schemeClr val="accent1"/>
+          </a:effectRef>
+          <a:fontRef idx="minor">
+            <a:schemeClr val="lt1"/>
+          </a:fontRef>
+        </p:style>
+        <p:txBody>
+          <a:bodyPr rtlCol="0" anchor="ctr"/>
+          <a:lstStyle/>
+          <a:p>
+            <a:pPr algn="ctr"/>
+            <a:r>
+              <a:rPr lang="en-US" dirty="0"/>
+              <a:t>512x512</a:t>
+            </a:r>
+          </a:p>
+        </p:txBody>
+      </p:sp>
+      <p:sp>
+        <p:nvSpPr>
+          <p:cNvPr id="7" name="矩形 6">
+            <a:extLst>
+              <a:ext uri="{FF2B5EF4-FFF2-40B4-BE49-F238E27FC236}">
+                <a16:creationId xmlns:a16="http://schemas.microsoft.com/office/drawing/2014/main" id="{BB24100E-1081-4227-A9AD-9A26B179A224}"/>
+              </a:ext>
+            </a:extLst>
+          </p:cNvPr>
+          <p:cNvSpPr/>
+          <p:nvPr/>
+        </p:nvSpPr>
+        <p:spPr>
+          <a:xfrm>
+            <a:off x="838199" y="1592344"/>
+            <a:ext cx="10515600" cy="422521"/>
+          </a:xfrm>
+          <a:prstGeom prst="rect">
+            <a:avLst/>
+          </a:prstGeom>
+          <a:solidFill>
+            <a:schemeClr val="accent5"/>
+          </a:solidFill>
+          <a:ln>
+            <a:noFill/>
+          </a:ln>
+        </p:spPr>
+        <p:style>
+          <a:lnRef idx="0">
+            <a:scrgbClr r="0" g="0" b="0"/>
+          </a:lnRef>
+          <a:fillRef idx="0">
+            <a:scrgbClr r="0" g="0" b="0"/>
+          </a:fillRef>
+          <a:effectRef idx="0">
+            <a:scrgbClr r="0" g="0" b="0"/>
+          </a:effectRef>
+          <a:fontRef idx="minor">
+            <a:schemeClr val="lt1"/>
+          </a:fontRef>
+        </p:style>
+        <p:txBody>
+          <a:bodyPr rtlCol="0" anchor="ctr"/>
+          <a:lstStyle/>
+          <a:p>
+            <a:r>
+              <a:rPr lang="en-US" dirty="0"/>
+              <a:t>Definition: the wind field of CFSR 850hPa reanalysis showed South-Westerlies.</a:t>
+            </a:r>
+          </a:p>
+        </p:txBody>
+      </p:sp>
+    </p:spTree>
+    <p:extLst>
+      <p:ext uri="{BB962C8B-B14F-4D97-AF65-F5344CB8AC3E}">
+        <p14:creationId xmlns:p14="http://schemas.microsoft.com/office/powerpoint/2010/main" val="1303901227"/>
+      </p:ext>
+    </p:extLst>
+  </p:cSld>
+  <p:clrMapOvr>
+    <a:masterClrMapping/>
+  </p:clrMapOvr>
+</p:sld>
+</file>
+
+<file path=ppt/slides/slide21.xml><?xml version="1.0" encoding="utf-8"?>
+<p:sld xmlns:a="http://schemas.openxmlformats.org/drawingml/2006/main" xmlns:r="http://schemas.openxmlformats.org/officeDocument/2006/relationships" xmlns:p="http://schemas.openxmlformats.org/presentationml/2006/main">
+  <p:cSld>
+    <p:spTree>
+      <p:nvGrpSpPr>
+        <p:cNvPr id="1" name=""/>
+        <p:cNvGrpSpPr/>
+        <p:nvPr/>
+      </p:nvGrpSpPr>
+      <p:grpSpPr>
+        <a:xfrm>
+          <a:off x="0" y="0"/>
+          <a:ext cx="0" cy="0"/>
+          <a:chOff x="0" y="0"/>
+          <a:chExt cx="0" cy="0"/>
+        </a:xfrm>
+      </p:grpSpPr>
+      <p:sp>
+        <p:nvSpPr>
+          <p:cNvPr id="2" name="Title 1">
+            <a:extLst>
+              <a:ext uri="{FF2B5EF4-FFF2-40B4-BE49-F238E27FC236}">
+                <a16:creationId xmlns:a16="http://schemas.microsoft.com/office/drawing/2014/main" id="{EA1937A3-5434-47CC-A80E-0F060042D66E}"/>
+              </a:ext>
+            </a:extLst>
+          </p:cNvPr>
+          <p:cNvSpPr>
+            <a:spLocks noGrp="1"/>
+          </p:cNvSpPr>
+          <p:nvPr>
+            <p:ph type="title"/>
+          </p:nvPr>
+        </p:nvSpPr>
+        <p:spPr/>
+        <p:txBody>
+          <a:bodyPr/>
+          <a:lstStyle/>
+          <a:p>
+            <a:r>
+              <a:rPr lang="en-US" b="1" dirty="0">
+                <a:effectLst>
+                  <a:outerShdw blurRad="38100" dist="38100" dir="2700000" algn="tl">
+                    <a:srgbClr val="000000">
+                      <a:alpha val="43137"/>
+                    </a:srgbClr>
+                  </a:outerShdw>
+                </a:effectLst>
+              </a:rPr>
+              <a:t>Takeaways</a:t>
+            </a:r>
+          </a:p>
+        </p:txBody>
+      </p:sp>
+      <p:sp>
+        <p:nvSpPr>
+          <p:cNvPr id="3" name="Content Placeholder 2">
+            <a:extLst>
+              <a:ext uri="{FF2B5EF4-FFF2-40B4-BE49-F238E27FC236}">
+                <a16:creationId xmlns:a16="http://schemas.microsoft.com/office/drawing/2014/main" id="{AAB5C6FE-9CFD-472C-9662-A37F816C2AD0}"/>
+              </a:ext>
+            </a:extLst>
+          </p:cNvPr>
+          <p:cNvSpPr>
+            <a:spLocks noGrp="1"/>
+          </p:cNvSpPr>
+          <p:nvPr>
+            <p:ph idx="1"/>
+          </p:nvPr>
+        </p:nvSpPr>
+        <p:spPr/>
+        <p:txBody>
+          <a:bodyPr/>
+          <a:lstStyle/>
+          <a:p>
+            <a:r>
+              <a:rPr lang="en-US" dirty="0"/>
+              <a:t>The pretrained models perform very well. And pretrained with only ImageNet performs even better.</a:t>
+            </a:r>
+          </a:p>
+          <a:p>
+            <a:r>
+              <a:rPr lang="en-US" dirty="0"/>
+              <a:t>The good old friend, PCA, is a decent method. The performance of PCA is similar to CAE, and the algorithm is solid and robust.</a:t>
+            </a:r>
+          </a:p>
+          <a:p>
+            <a:r>
+              <a:rPr lang="en-US" dirty="0"/>
+              <a:t>SWF can be detected with a high hit-rate (0.92). NE is not as good as SWF but is still not bad. This suggests that the satellite image can provide information about synoptic scale wind patterns.</a:t>
+            </a:r>
+          </a:p>
+          <a:p>
+            <a:endParaRPr lang="en-US" dirty="0"/>
+          </a:p>
+        </p:txBody>
+      </p:sp>
+    </p:spTree>
+    <p:extLst>
+      <p:ext uri="{BB962C8B-B14F-4D97-AF65-F5344CB8AC3E}">
+        <p14:creationId xmlns:p14="http://schemas.microsoft.com/office/powerpoint/2010/main" val="3225063580"/>
       </p:ext>
     </p:extLst>
   </p:cSld>

</xml_diff>